<commit_message>
Work on the powerpoint presentation
</commit_message>
<xml_diff>
--- a/Presentation.pptx
+++ b/Presentation.pptx
@@ -5,14 +5,18 @@
     <p:sldMasterId id="2147483648" r:id="rId1"/>
   </p:sldMasterIdLst>
   <p:notesMasterIdLst>
-    <p:notesMasterId r:id="rId7"/>
+    <p:notesMasterId r:id="rId11"/>
   </p:notesMasterIdLst>
   <p:sldIdLst>
-    <p:sldId id="256" r:id="rId2"/>
-    <p:sldId id="258" r:id="rId3"/>
-    <p:sldId id="260" r:id="rId4"/>
-    <p:sldId id="259" r:id="rId5"/>
-    <p:sldId id="257" r:id="rId6"/>
+    <p:sldId id="264" r:id="rId2"/>
+    <p:sldId id="261" r:id="rId3"/>
+    <p:sldId id="262" r:id="rId4"/>
+    <p:sldId id="256" r:id="rId5"/>
+    <p:sldId id="258" r:id="rId6"/>
+    <p:sldId id="260" r:id="rId7"/>
+    <p:sldId id="259" r:id="rId8"/>
+    <p:sldId id="263" r:id="rId9"/>
+    <p:sldId id="257" r:id="rId10"/>
   </p:sldIdLst>
   <p:sldSz cx="12192000" cy="6858000"/>
   <p:notesSz cx="6858000" cy="9144000"/>
@@ -111,7 +115,310 @@
       </a:defRPr>
     </a:lvl9pPr>
   </p:defaultTextStyle>
+  <p:extLst>
+    <p:ext uri="{EFAFB233-063F-42B5-8137-9DF3F51BA10A}">
+      <p15:sldGuideLst xmlns:p15="http://schemas.microsoft.com/office/powerpoint/2012/main">
+        <p15:guide id="1" orient="horz" pos="2160">
+          <p15:clr>
+            <a:srgbClr val="A4A3A4"/>
+          </p15:clr>
+        </p15:guide>
+        <p15:guide id="2" pos="3840">
+          <p15:clr>
+            <a:srgbClr val="A4A3A4"/>
+          </p15:clr>
+        </p15:guide>
+      </p15:sldGuideLst>
+    </p:ext>
+  </p:extLst>
 </p:presentation>
+</file>
+
+<file path=ppt/changesInfos/changesInfo1.xml><?xml version="1.0" encoding="utf-8"?>
+<pc:chgInfo xmlns:a="http://schemas.openxmlformats.org/drawingml/2006/main" xmlns:r="http://schemas.openxmlformats.org/officeDocument/2006/relationships" xmlns:ac="http://schemas.microsoft.com/office/drawing/2013/main/command" xmlns:pc="http://schemas.microsoft.com/office/powerpoint/2013/main/command">
+  <pc:docChgLst>
+    <pc:chgData name="Masini, Connor Joseph" userId="S::masinico@msu.edu::fb9f99fe-262f-4d83-b3d2-ce4a1e383998" providerId="AD" clId="Web-{BF70851B-CE0E-42A6-AFCA-F9A6CCDDF1F7}"/>
+    <pc:docChg chg="addSld delSld modSld sldOrd">
+      <pc:chgData name="Masini, Connor Joseph" userId="S::masinico@msu.edu::fb9f99fe-262f-4d83-b3d2-ce4a1e383998" providerId="AD" clId="Web-{BF70851B-CE0E-42A6-AFCA-F9A6CCDDF1F7}" dt="2018-11-30T03:37:41.363" v="1215" actId="20577"/>
+      <pc:docMkLst>
+        <pc:docMk/>
+      </pc:docMkLst>
+      <pc:sldChg chg="modSp">
+        <pc:chgData name="Masini, Connor Joseph" userId="S::masinico@msu.edu::fb9f99fe-262f-4d83-b3d2-ce4a1e383998" providerId="AD" clId="Web-{BF70851B-CE0E-42A6-AFCA-F9A6CCDDF1F7}" dt="2018-11-30T03:32:18.629" v="1165" actId="1076"/>
+        <pc:sldMkLst>
+          <pc:docMk/>
+          <pc:sldMk cId="134316093" sldId="256"/>
+        </pc:sldMkLst>
+        <pc:spChg chg="mod">
+          <ac:chgData name="Masini, Connor Joseph" userId="S::masinico@msu.edu::fb9f99fe-262f-4d83-b3d2-ce4a1e383998" providerId="AD" clId="Web-{BF70851B-CE0E-42A6-AFCA-F9A6CCDDF1F7}" dt="2018-11-30T03:32:18.489" v="1150" actId="1076"/>
+          <ac:spMkLst>
+            <pc:docMk/>
+            <pc:sldMk cId="134316093" sldId="256"/>
+            <ac:spMk id="7" creationId="{00000000-0000-0000-0000-000000000000}"/>
+          </ac:spMkLst>
+        </pc:spChg>
+        <pc:spChg chg="mod">
+          <ac:chgData name="Masini, Connor Joseph" userId="S::masinico@msu.edu::fb9f99fe-262f-4d83-b3d2-ce4a1e383998" providerId="AD" clId="Web-{BF70851B-CE0E-42A6-AFCA-F9A6CCDDF1F7}" dt="2018-11-30T03:32:18.489" v="1151" actId="1076"/>
+          <ac:spMkLst>
+            <pc:docMk/>
+            <pc:sldMk cId="134316093" sldId="256"/>
+            <ac:spMk id="10" creationId="{00000000-0000-0000-0000-000000000000}"/>
+          </ac:spMkLst>
+        </pc:spChg>
+        <pc:spChg chg="mod">
+          <ac:chgData name="Masini, Connor Joseph" userId="S::masinico@msu.edu::fb9f99fe-262f-4d83-b3d2-ce4a1e383998" providerId="AD" clId="Web-{BF70851B-CE0E-42A6-AFCA-F9A6CCDDF1F7}" dt="2018-11-30T03:32:18.504" v="1154" actId="1076"/>
+          <ac:spMkLst>
+            <pc:docMk/>
+            <pc:sldMk cId="134316093" sldId="256"/>
+            <ac:spMk id="33" creationId="{00000000-0000-0000-0000-000000000000}"/>
+          </ac:spMkLst>
+        </pc:spChg>
+        <pc:spChg chg="mod">
+          <ac:chgData name="Masini, Connor Joseph" userId="S::masinico@msu.edu::fb9f99fe-262f-4d83-b3d2-ce4a1e383998" providerId="AD" clId="Web-{BF70851B-CE0E-42A6-AFCA-F9A6CCDDF1F7}" dt="2018-11-30T03:32:18.520" v="1155" actId="1076"/>
+          <ac:spMkLst>
+            <pc:docMk/>
+            <pc:sldMk cId="134316093" sldId="256"/>
+            <ac:spMk id="34" creationId="{00000000-0000-0000-0000-000000000000}"/>
+          </ac:spMkLst>
+        </pc:spChg>
+        <pc:spChg chg="mod">
+          <ac:chgData name="Masini, Connor Joseph" userId="S::masinico@msu.edu::fb9f99fe-262f-4d83-b3d2-ce4a1e383998" providerId="AD" clId="Web-{BF70851B-CE0E-42A6-AFCA-F9A6CCDDF1F7}" dt="2018-11-30T03:32:18.520" v="1156" actId="1076"/>
+          <ac:spMkLst>
+            <pc:docMk/>
+            <pc:sldMk cId="134316093" sldId="256"/>
+            <ac:spMk id="35" creationId="{00000000-0000-0000-0000-000000000000}"/>
+          </ac:spMkLst>
+        </pc:spChg>
+        <pc:spChg chg="mod">
+          <ac:chgData name="Masini, Connor Joseph" userId="S::masinico@msu.edu::fb9f99fe-262f-4d83-b3d2-ce4a1e383998" providerId="AD" clId="Web-{BF70851B-CE0E-42A6-AFCA-F9A6CCDDF1F7}" dt="2018-11-30T03:32:18.551" v="1157" actId="1076"/>
+          <ac:spMkLst>
+            <pc:docMk/>
+            <pc:sldMk cId="134316093" sldId="256"/>
+            <ac:spMk id="37" creationId="{00000000-0000-0000-0000-000000000000}"/>
+          </ac:spMkLst>
+        </pc:spChg>
+        <pc:spChg chg="mod">
+          <ac:chgData name="Masini, Connor Joseph" userId="S::masinico@msu.edu::fb9f99fe-262f-4d83-b3d2-ce4a1e383998" providerId="AD" clId="Web-{BF70851B-CE0E-42A6-AFCA-F9A6CCDDF1F7}" dt="2018-11-30T03:32:18.567" v="1158" actId="1076"/>
+          <ac:spMkLst>
+            <pc:docMk/>
+            <pc:sldMk cId="134316093" sldId="256"/>
+            <ac:spMk id="75" creationId="{00000000-0000-0000-0000-000000000000}"/>
+          </ac:spMkLst>
+        </pc:spChg>
+        <pc:spChg chg="mod">
+          <ac:chgData name="Masini, Connor Joseph" userId="S::masinico@msu.edu::fb9f99fe-262f-4d83-b3d2-ce4a1e383998" providerId="AD" clId="Web-{BF70851B-CE0E-42A6-AFCA-F9A6CCDDF1F7}" dt="2018-11-30T03:32:18.582" v="1160" actId="1076"/>
+          <ac:spMkLst>
+            <pc:docMk/>
+            <pc:sldMk cId="134316093" sldId="256"/>
+            <ac:spMk id="85" creationId="{00000000-0000-0000-0000-000000000000}"/>
+          </ac:spMkLst>
+        </pc:spChg>
+        <pc:spChg chg="mod">
+          <ac:chgData name="Masini, Connor Joseph" userId="S::masinico@msu.edu::fb9f99fe-262f-4d83-b3d2-ce4a1e383998" providerId="AD" clId="Web-{BF70851B-CE0E-42A6-AFCA-F9A6CCDDF1F7}" dt="2018-11-30T03:32:18.598" v="1162" actId="1076"/>
+          <ac:spMkLst>
+            <pc:docMk/>
+            <pc:sldMk cId="134316093" sldId="256"/>
+            <ac:spMk id="104" creationId="{00000000-0000-0000-0000-000000000000}"/>
+          </ac:spMkLst>
+        </pc:spChg>
+        <pc:spChg chg="mod">
+          <ac:chgData name="Masini, Connor Joseph" userId="S::masinico@msu.edu::fb9f99fe-262f-4d83-b3d2-ce4a1e383998" providerId="AD" clId="Web-{BF70851B-CE0E-42A6-AFCA-F9A6CCDDF1F7}" dt="2018-11-30T03:32:18.614" v="1163" actId="1076"/>
+          <ac:spMkLst>
+            <pc:docMk/>
+            <pc:sldMk cId="134316093" sldId="256"/>
+            <ac:spMk id="105" creationId="{00000000-0000-0000-0000-000000000000}"/>
+          </ac:spMkLst>
+        </pc:spChg>
+        <pc:spChg chg="mod">
+          <ac:chgData name="Masini, Connor Joseph" userId="S::masinico@msu.edu::fb9f99fe-262f-4d83-b3d2-ce4a1e383998" providerId="AD" clId="Web-{BF70851B-CE0E-42A6-AFCA-F9A6CCDDF1F7}" dt="2018-11-30T03:32:18.614" v="1164" actId="1076"/>
+          <ac:spMkLst>
+            <pc:docMk/>
+            <pc:sldMk cId="134316093" sldId="256"/>
+            <ac:spMk id="106" creationId="{00000000-0000-0000-0000-000000000000}"/>
+          </ac:spMkLst>
+        </pc:spChg>
+        <pc:spChg chg="mod">
+          <ac:chgData name="Masini, Connor Joseph" userId="S::masinico@msu.edu::fb9f99fe-262f-4d83-b3d2-ce4a1e383998" providerId="AD" clId="Web-{BF70851B-CE0E-42A6-AFCA-F9A6CCDDF1F7}" dt="2018-11-30T03:32:18.629" v="1165" actId="1076"/>
+          <ac:spMkLst>
+            <pc:docMk/>
+            <pc:sldMk cId="134316093" sldId="256"/>
+            <ac:spMk id="107" creationId="{00000000-0000-0000-0000-000000000000}"/>
+          </ac:spMkLst>
+        </pc:spChg>
+        <pc:grpChg chg="mod">
+          <ac:chgData name="Masini, Connor Joseph" userId="S::masinico@msu.edu::fb9f99fe-262f-4d83-b3d2-ce4a1e383998" providerId="AD" clId="Web-{BF70851B-CE0E-42A6-AFCA-F9A6CCDDF1F7}" dt="2018-11-30T03:32:18.504" v="1153" actId="1076"/>
+          <ac:grpSpMkLst>
+            <pc:docMk/>
+            <pc:sldMk cId="134316093" sldId="256"/>
+            <ac:grpSpMk id="22" creationId="{00000000-0000-0000-0000-000000000000}"/>
+          </ac:grpSpMkLst>
+        </pc:grpChg>
+        <pc:grpChg chg="mod">
+          <ac:chgData name="Masini, Connor Joseph" userId="S::masinico@msu.edu::fb9f99fe-262f-4d83-b3d2-ce4a1e383998" providerId="AD" clId="Web-{BF70851B-CE0E-42A6-AFCA-F9A6CCDDF1F7}" dt="2018-11-30T03:32:18.504" v="1152" actId="1076"/>
+          <ac:grpSpMkLst>
+            <pc:docMk/>
+            <pc:sldMk cId="134316093" sldId="256"/>
+            <ac:grpSpMk id="23" creationId="{00000000-0000-0000-0000-000000000000}"/>
+          </ac:grpSpMkLst>
+        </pc:grpChg>
+        <pc:grpChg chg="mod">
+          <ac:chgData name="Masini, Connor Joseph" userId="S::masinico@msu.edu::fb9f99fe-262f-4d83-b3d2-ce4a1e383998" providerId="AD" clId="Web-{BF70851B-CE0E-42A6-AFCA-F9A6CCDDF1F7}" dt="2018-11-30T03:32:18.582" v="1159" actId="1076"/>
+          <ac:grpSpMkLst>
+            <pc:docMk/>
+            <pc:sldMk cId="134316093" sldId="256"/>
+            <ac:grpSpMk id="76" creationId="{00000000-0000-0000-0000-000000000000}"/>
+          </ac:grpSpMkLst>
+        </pc:grpChg>
+        <pc:grpChg chg="mod">
+          <ac:chgData name="Masini, Connor Joseph" userId="S::masinico@msu.edu::fb9f99fe-262f-4d83-b3d2-ce4a1e383998" providerId="AD" clId="Web-{BF70851B-CE0E-42A6-AFCA-F9A6CCDDF1F7}" dt="2018-11-30T03:32:18.598" v="1161" actId="1076"/>
+          <ac:grpSpMkLst>
+            <pc:docMk/>
+            <pc:sldMk cId="134316093" sldId="256"/>
+            <ac:grpSpMk id="86" creationId="{00000000-0000-0000-0000-000000000000}"/>
+          </ac:grpSpMkLst>
+        </pc:grpChg>
+      </pc:sldChg>
+      <pc:sldChg chg="modSp">
+        <pc:chgData name="Masini, Connor Joseph" userId="S::masinico@msu.edu::fb9f99fe-262f-4d83-b3d2-ce4a1e383998" providerId="AD" clId="Web-{BF70851B-CE0E-42A6-AFCA-F9A6CCDDF1F7}" dt="2018-11-30T03:20:07.896" v="847" actId="20577"/>
+        <pc:sldMkLst>
+          <pc:docMk/>
+          <pc:sldMk cId="246938554" sldId="257"/>
+        </pc:sldMkLst>
+        <pc:spChg chg="mod">
+          <ac:chgData name="Masini, Connor Joseph" userId="S::masinico@msu.edu::fb9f99fe-262f-4d83-b3d2-ce4a1e383998" providerId="AD" clId="Web-{BF70851B-CE0E-42A6-AFCA-F9A6CCDDF1F7}" dt="2018-11-30T03:20:02.161" v="840" actId="20577"/>
+          <ac:spMkLst>
+            <pc:docMk/>
+            <pc:sldMk cId="246938554" sldId="257"/>
+            <ac:spMk id="4" creationId="{00000000-0000-0000-0000-000000000000}"/>
+          </ac:spMkLst>
+        </pc:spChg>
+        <pc:spChg chg="mod">
+          <ac:chgData name="Masini, Connor Joseph" userId="S::masinico@msu.edu::fb9f99fe-262f-4d83-b3d2-ce4a1e383998" providerId="AD" clId="Web-{BF70851B-CE0E-42A6-AFCA-F9A6CCDDF1F7}" dt="2018-11-30T03:20:07.896" v="847" actId="20577"/>
+          <ac:spMkLst>
+            <pc:docMk/>
+            <pc:sldMk cId="246938554" sldId="257"/>
+            <ac:spMk id="5" creationId="{00000000-0000-0000-0000-000000000000}"/>
+          </ac:spMkLst>
+        </pc:spChg>
+      </pc:sldChg>
+      <pc:sldChg chg="modSp new ord">
+        <pc:chgData name="Masini, Connor Joseph" userId="S::masinico@msu.edu::fb9f99fe-262f-4d83-b3d2-ce4a1e383998" providerId="AD" clId="Web-{BF70851B-CE0E-42A6-AFCA-F9A6CCDDF1F7}" dt="2018-11-30T03:09:17.865" v="377" actId="20577"/>
+        <pc:sldMkLst>
+          <pc:docMk/>
+          <pc:sldMk cId="3523354900" sldId="261"/>
+        </pc:sldMkLst>
+        <pc:spChg chg="mod">
+          <ac:chgData name="Masini, Connor Joseph" userId="S::masinico@msu.edu::fb9f99fe-262f-4d83-b3d2-ce4a1e383998" providerId="AD" clId="Web-{BF70851B-CE0E-42A6-AFCA-F9A6CCDDF1F7}" dt="2018-11-30T03:02:20.912" v="13" actId="20577"/>
+          <ac:spMkLst>
+            <pc:docMk/>
+            <pc:sldMk cId="3523354900" sldId="261"/>
+            <ac:spMk id="2" creationId="{A5624086-7587-4A30-86E8-B6E94C50EC7E}"/>
+          </ac:spMkLst>
+        </pc:spChg>
+        <pc:spChg chg="mod">
+          <ac:chgData name="Masini, Connor Joseph" userId="S::masinico@msu.edu::fb9f99fe-262f-4d83-b3d2-ce4a1e383998" providerId="AD" clId="Web-{BF70851B-CE0E-42A6-AFCA-F9A6CCDDF1F7}" dt="2018-11-30T03:09:17.865" v="377" actId="20577"/>
+          <ac:spMkLst>
+            <pc:docMk/>
+            <pc:sldMk cId="3523354900" sldId="261"/>
+            <ac:spMk id="3" creationId="{93CEA45F-C19F-4939-A6DA-108762FEF866}"/>
+          </ac:spMkLst>
+        </pc:spChg>
+      </pc:sldChg>
+      <pc:sldChg chg="modSp new">
+        <pc:chgData name="Masini, Connor Joseph" userId="S::masinico@msu.edu::fb9f99fe-262f-4d83-b3d2-ce4a1e383998" providerId="AD" clId="Web-{BF70851B-CE0E-42A6-AFCA-F9A6CCDDF1F7}" dt="2018-11-30T03:31:54.957" v="1148" actId="20577"/>
+        <pc:sldMkLst>
+          <pc:docMk/>
+          <pc:sldMk cId="3366713997" sldId="262"/>
+        </pc:sldMkLst>
+        <pc:spChg chg="mod">
+          <ac:chgData name="Masini, Connor Joseph" userId="S::masinico@msu.edu::fb9f99fe-262f-4d83-b3d2-ce4a1e383998" providerId="AD" clId="Web-{BF70851B-CE0E-42A6-AFCA-F9A6CCDDF1F7}" dt="2018-11-30T03:09:32.490" v="387" actId="20577"/>
+          <ac:spMkLst>
+            <pc:docMk/>
+            <pc:sldMk cId="3366713997" sldId="262"/>
+            <ac:spMk id="2" creationId="{F7942215-CB3B-4F41-8B85-241EEF04CBA9}"/>
+          </ac:spMkLst>
+        </pc:spChg>
+        <pc:spChg chg="mod">
+          <ac:chgData name="Masini, Connor Joseph" userId="S::masinico@msu.edu::fb9f99fe-262f-4d83-b3d2-ce4a1e383998" providerId="AD" clId="Web-{BF70851B-CE0E-42A6-AFCA-F9A6CCDDF1F7}" dt="2018-11-30T03:31:54.957" v="1148" actId="20577"/>
+          <ac:spMkLst>
+            <pc:docMk/>
+            <pc:sldMk cId="3366713997" sldId="262"/>
+            <ac:spMk id="3" creationId="{B0F17705-6B42-4A5B-A3EE-6A052D7E1874}"/>
+          </ac:spMkLst>
+        </pc:spChg>
+      </pc:sldChg>
+      <pc:sldChg chg="addSp delSp modSp new">
+        <pc:chgData name="Masini, Connor Joseph" userId="S::masinico@msu.edu::fb9f99fe-262f-4d83-b3d2-ce4a1e383998" providerId="AD" clId="Web-{BF70851B-CE0E-42A6-AFCA-F9A6CCDDF1F7}" dt="2018-11-30T03:37:41.363" v="1214" actId="20577"/>
+        <pc:sldMkLst>
+          <pc:docMk/>
+          <pc:sldMk cId="2263836486" sldId="263"/>
+        </pc:sldMkLst>
+        <pc:spChg chg="mod">
+          <ac:chgData name="Masini, Connor Joseph" userId="S::masinico@msu.edu::fb9f99fe-262f-4d83-b3d2-ce4a1e383998" providerId="AD" clId="Web-{BF70851B-CE0E-42A6-AFCA-F9A6CCDDF1F7}" dt="2018-11-30T03:24:48.208" v="1098" actId="20577"/>
+          <ac:spMkLst>
+            <pc:docMk/>
+            <pc:sldMk cId="2263836486" sldId="263"/>
+            <ac:spMk id="2" creationId="{D3F650D5-FB13-405A-9F0C-3F357019BD1A}"/>
+          </ac:spMkLst>
+        </pc:spChg>
+        <pc:spChg chg="del">
+          <ac:chgData name="Masini, Connor Joseph" userId="S::masinico@msu.edu::fb9f99fe-262f-4d83-b3d2-ce4a1e383998" providerId="AD" clId="Web-{BF70851B-CE0E-42A6-AFCA-F9A6CCDDF1F7}" dt="2018-11-30T03:21:09.942" v="875"/>
+          <ac:spMkLst>
+            <pc:docMk/>
+            <pc:sldMk cId="2263836486" sldId="263"/>
+            <ac:spMk id="3" creationId="{E2C8AE70-2EBE-40C4-9A89-7E722829ABB5}"/>
+          </ac:spMkLst>
+        </pc:spChg>
+        <pc:spChg chg="add mod">
+          <ac:chgData name="Masini, Connor Joseph" userId="S::masinico@msu.edu::fb9f99fe-262f-4d83-b3d2-ce4a1e383998" providerId="AD" clId="Web-{BF70851B-CE0E-42A6-AFCA-F9A6CCDDF1F7}" dt="2018-11-30T03:37:41.363" v="1214" actId="20577"/>
+          <ac:spMkLst>
+            <pc:docMk/>
+            <pc:sldMk cId="2263836486" sldId="263"/>
+            <ac:spMk id="6" creationId="{06A6DF50-0464-4455-8FC7-427F48B7FFE8}"/>
+          </ac:spMkLst>
+        </pc:spChg>
+        <pc:graphicFrameChg chg="add mod ord modGraphic">
+          <ac:chgData name="Masini, Connor Joseph" userId="S::masinico@msu.edu::fb9f99fe-262f-4d83-b3d2-ce4a1e383998" providerId="AD" clId="Web-{BF70851B-CE0E-42A6-AFCA-F9A6CCDDF1F7}" dt="2018-11-30T03:24:19.099" v="1095"/>
+          <ac:graphicFrameMkLst>
+            <pc:docMk/>
+            <pc:sldMk cId="2263836486" sldId="263"/>
+            <ac:graphicFrameMk id="4" creationId="{770AFD70-F852-4F13-A4D5-88EAFD69D04E}"/>
+          </ac:graphicFrameMkLst>
+        </pc:graphicFrameChg>
+      </pc:sldChg>
+      <pc:sldChg chg="new del">
+        <pc:chgData name="Masini, Connor Joseph" userId="S::masinico@msu.edu::fb9f99fe-262f-4d83-b3d2-ce4a1e383998" providerId="AD" clId="Web-{BF70851B-CE0E-42A6-AFCA-F9A6CCDDF1F7}" dt="2018-11-30T03:20:23.427" v="850"/>
+        <pc:sldMkLst>
+          <pc:docMk/>
+          <pc:sldMk cId="2569244039" sldId="263"/>
+        </pc:sldMkLst>
+      </pc:sldChg>
+      <pc:sldChg chg="modSp new ord">
+        <pc:chgData name="Masini, Connor Joseph" userId="S::masinico@msu.edu::fb9f99fe-262f-4d83-b3d2-ce4a1e383998" providerId="AD" clId="Web-{BF70851B-CE0E-42A6-AFCA-F9A6CCDDF1F7}" dt="2018-11-30T03:25:48.473" v="1137" actId="20577"/>
+        <pc:sldMkLst>
+          <pc:docMk/>
+          <pc:sldMk cId="3053653551" sldId="264"/>
+        </pc:sldMkLst>
+        <pc:spChg chg="mod">
+          <ac:chgData name="Masini, Connor Joseph" userId="S::masinico@msu.edu::fb9f99fe-262f-4d83-b3d2-ce4a1e383998" providerId="AD" clId="Web-{BF70851B-CE0E-42A6-AFCA-F9A6CCDDF1F7}" dt="2018-11-30T03:25:48.473" v="1137" actId="20577"/>
+          <ac:spMkLst>
+            <pc:docMk/>
+            <pc:sldMk cId="3053653551" sldId="264"/>
+            <ac:spMk id="2" creationId="{82DFB4A3-68B1-4FB4-AC1D-1645C6AC3903}"/>
+          </ac:spMkLst>
+        </pc:spChg>
+        <pc:spChg chg="mod">
+          <ac:chgData name="Masini, Connor Joseph" userId="S::masinico@msu.edu::fb9f99fe-262f-4d83-b3d2-ce4a1e383998" providerId="AD" clId="Web-{BF70851B-CE0E-42A6-AFCA-F9A6CCDDF1F7}" dt="2018-11-30T03:25:35.630" v="1116" actId="20577"/>
+          <ac:spMkLst>
+            <pc:docMk/>
+            <pc:sldMk cId="3053653551" sldId="264"/>
+            <ac:spMk id="3" creationId="{28A14AAF-6BDC-49FF-AC11-95237C1FA6B5}"/>
+          </ac:spMkLst>
+        </pc:spChg>
+      </pc:sldChg>
+    </pc:docChg>
+  </pc:docChgLst>
+</pc:chgInfo>
 </file>
 
 <file path=ppt/notesMasters/notesMaster1.xml><?xml version="1.0" encoding="utf-8"?>
@@ -196,7 +503,7 @@
           <a:p>
             <a:fld id="{4596391A-C1A4-0447-8C2A-1E37BBA9C7F5}" type="datetimeFigureOut">
               <a:rPr lang="en-US" smtClean="0"/>
-              <a:t>11/28/18</a:t>
+              <a:t>11/29/2018</a:t>
             </a:fld>
             <a:endParaRPr lang="en-US"/>
           </a:p>
@@ -260,38 +567,37 @@
           <a:p>
             <a:pPr lvl="0"/>
             <a:r>
-              <a:rPr lang="en-US" smtClean="0"/>
+              <a:rPr lang="en-US"/>
               <a:t>Click to edit Master text styles</a:t>
             </a:r>
           </a:p>
           <a:p>
             <a:pPr lvl="1"/>
             <a:r>
-              <a:rPr lang="en-US" smtClean="0"/>
+              <a:rPr lang="en-US"/>
               <a:t>Second level</a:t>
             </a:r>
           </a:p>
           <a:p>
             <a:pPr lvl="2"/>
             <a:r>
-              <a:rPr lang="en-US" smtClean="0"/>
+              <a:rPr lang="en-US"/>
               <a:t>Third level</a:t>
             </a:r>
           </a:p>
           <a:p>
             <a:pPr lvl="3"/>
             <a:r>
-              <a:rPr lang="en-US" smtClean="0"/>
+              <a:rPr lang="en-US"/>
               <a:t>Fourth level</a:t>
             </a:r>
           </a:p>
           <a:p>
             <a:pPr lvl="4"/>
             <a:r>
-              <a:rPr lang="en-US" smtClean="0"/>
+              <a:rPr lang="en-US"/>
               <a:t>Fifth level</a:t>
             </a:r>
-            <a:endParaRPr lang="en-US"/>
           </a:p>
         </p:txBody>
       </p:sp>
@@ -593,11 +899,11 @@
           <a:lstStyle/>
           <a:p>
             <a:r>
-              <a:rPr lang="en-US" dirty="0" smtClean="0"/>
+              <a:rPr lang="en-US" dirty="0"/>
               <a:t>Out</a:t>
             </a:r>
             <a:r>
-              <a:rPr lang="en-US" baseline="0" dirty="0" smtClean="0"/>
+              <a:rPr lang="en-US" baseline="0" dirty="0"/>
               <a:t> future is plan is to assign different numbers of neurons on different layers of one network</a:t>
             </a:r>
             <a:endParaRPr lang="en-US" dirty="0"/>
@@ -682,10 +988,9 @@
           </a:lstStyle>
           <a:p>
             <a:r>
-              <a:rPr lang="en-US" smtClean="0"/>
+              <a:rPr lang="en-US"/>
               <a:t>Click to edit Master title style</a:t>
             </a:r>
-            <a:endParaRPr lang="en-US"/>
           </a:p>
         </p:txBody>
       </p:sp>
@@ -747,10 +1052,9 @@
           </a:lstStyle>
           <a:p>
             <a:r>
-              <a:rPr lang="en-US" smtClean="0"/>
+              <a:rPr lang="en-US"/>
               <a:t>Click to edit Master subtitle style</a:t>
             </a:r>
-            <a:endParaRPr lang="en-US"/>
           </a:p>
         </p:txBody>
       </p:sp>
@@ -771,7 +1075,7 @@
           <a:p>
             <a:fld id="{DC7CFDF0-330C-CD4E-97ED-63819D162666}" type="datetimeFigureOut">
               <a:rPr lang="en-US" smtClean="0"/>
-              <a:t>11/28/18</a:t>
+              <a:t>11/29/2018</a:t>
             </a:fld>
             <a:endParaRPr lang="en-US"/>
           </a:p>
@@ -865,10 +1169,9 @@
           <a:lstStyle/>
           <a:p>
             <a:r>
-              <a:rPr lang="en-US" smtClean="0"/>
+              <a:rPr lang="en-US"/>
               <a:t>Click to edit Master title style</a:t>
             </a:r>
-            <a:endParaRPr lang="en-US"/>
           </a:p>
         </p:txBody>
       </p:sp>
@@ -889,38 +1192,37 @@
           <a:p>
             <a:pPr lvl="0"/>
             <a:r>
-              <a:rPr lang="en-US" smtClean="0"/>
+              <a:rPr lang="en-US"/>
               <a:t>Click to edit Master text styles</a:t>
             </a:r>
           </a:p>
           <a:p>
             <a:pPr lvl="1"/>
             <a:r>
-              <a:rPr lang="en-US" smtClean="0"/>
+              <a:rPr lang="en-US"/>
               <a:t>Second level</a:t>
             </a:r>
           </a:p>
           <a:p>
             <a:pPr lvl="2"/>
             <a:r>
-              <a:rPr lang="en-US" smtClean="0"/>
+              <a:rPr lang="en-US"/>
               <a:t>Third level</a:t>
             </a:r>
           </a:p>
           <a:p>
             <a:pPr lvl="3"/>
             <a:r>
-              <a:rPr lang="en-US" smtClean="0"/>
+              <a:rPr lang="en-US"/>
               <a:t>Fourth level</a:t>
             </a:r>
           </a:p>
           <a:p>
             <a:pPr lvl="4"/>
             <a:r>
-              <a:rPr lang="en-US" smtClean="0"/>
+              <a:rPr lang="en-US"/>
               <a:t>Fifth level</a:t>
             </a:r>
-            <a:endParaRPr lang="en-US"/>
           </a:p>
         </p:txBody>
       </p:sp>
@@ -941,7 +1243,7 @@
           <a:p>
             <a:fld id="{DC7CFDF0-330C-CD4E-97ED-63819D162666}" type="datetimeFigureOut">
               <a:rPr lang="en-US" smtClean="0"/>
-              <a:t>11/28/18</a:t>
+              <a:t>11/29/2018</a:t>
             </a:fld>
             <a:endParaRPr lang="en-US"/>
           </a:p>
@@ -1040,10 +1342,9 @@
           <a:lstStyle/>
           <a:p>
             <a:r>
-              <a:rPr lang="en-US" smtClean="0"/>
+              <a:rPr lang="en-US"/>
               <a:t>Click to edit Master title style</a:t>
             </a:r>
-            <a:endParaRPr lang="en-US"/>
           </a:p>
         </p:txBody>
       </p:sp>
@@ -1069,38 +1370,37 @@
           <a:p>
             <a:pPr lvl="0"/>
             <a:r>
-              <a:rPr lang="en-US" smtClean="0"/>
+              <a:rPr lang="en-US"/>
               <a:t>Click to edit Master text styles</a:t>
             </a:r>
           </a:p>
           <a:p>
             <a:pPr lvl="1"/>
             <a:r>
-              <a:rPr lang="en-US" smtClean="0"/>
+              <a:rPr lang="en-US"/>
               <a:t>Second level</a:t>
             </a:r>
           </a:p>
           <a:p>
             <a:pPr lvl="2"/>
             <a:r>
-              <a:rPr lang="en-US" smtClean="0"/>
+              <a:rPr lang="en-US"/>
               <a:t>Third level</a:t>
             </a:r>
           </a:p>
           <a:p>
             <a:pPr lvl="3"/>
             <a:r>
-              <a:rPr lang="en-US" smtClean="0"/>
+              <a:rPr lang="en-US"/>
               <a:t>Fourth level</a:t>
             </a:r>
           </a:p>
           <a:p>
             <a:pPr lvl="4"/>
             <a:r>
-              <a:rPr lang="en-US" smtClean="0"/>
+              <a:rPr lang="en-US"/>
               <a:t>Fifth level</a:t>
             </a:r>
-            <a:endParaRPr lang="en-US"/>
           </a:p>
         </p:txBody>
       </p:sp>
@@ -1121,7 +1421,7 @@
           <a:p>
             <a:fld id="{DC7CFDF0-330C-CD4E-97ED-63819D162666}" type="datetimeFigureOut">
               <a:rPr lang="en-US" smtClean="0"/>
-              <a:t>11/28/18</a:t>
+              <a:t>11/29/2018</a:t>
             </a:fld>
             <a:endParaRPr lang="en-US"/>
           </a:p>
@@ -1215,10 +1515,9 @@
           <a:lstStyle/>
           <a:p>
             <a:r>
-              <a:rPr lang="en-US" smtClean="0"/>
+              <a:rPr lang="en-US"/>
               <a:t>Click to edit Master title style</a:t>
             </a:r>
-            <a:endParaRPr lang="en-US"/>
           </a:p>
         </p:txBody>
       </p:sp>
@@ -1239,38 +1538,37 @@
           <a:p>
             <a:pPr lvl="0"/>
             <a:r>
-              <a:rPr lang="en-US" smtClean="0"/>
+              <a:rPr lang="en-US"/>
               <a:t>Click to edit Master text styles</a:t>
             </a:r>
           </a:p>
           <a:p>
             <a:pPr lvl="1"/>
             <a:r>
-              <a:rPr lang="en-US" smtClean="0"/>
+              <a:rPr lang="en-US"/>
               <a:t>Second level</a:t>
             </a:r>
           </a:p>
           <a:p>
             <a:pPr lvl="2"/>
             <a:r>
-              <a:rPr lang="en-US" smtClean="0"/>
+              <a:rPr lang="en-US"/>
               <a:t>Third level</a:t>
             </a:r>
           </a:p>
           <a:p>
             <a:pPr lvl="3"/>
             <a:r>
-              <a:rPr lang="en-US" smtClean="0"/>
+              <a:rPr lang="en-US"/>
               <a:t>Fourth level</a:t>
             </a:r>
           </a:p>
           <a:p>
             <a:pPr lvl="4"/>
             <a:r>
-              <a:rPr lang="en-US" smtClean="0"/>
+              <a:rPr lang="en-US"/>
               <a:t>Fifth level</a:t>
             </a:r>
-            <a:endParaRPr lang="en-US"/>
           </a:p>
         </p:txBody>
       </p:sp>
@@ -1291,7 +1589,7 @@
           <a:p>
             <a:fld id="{DC7CFDF0-330C-CD4E-97ED-63819D162666}" type="datetimeFigureOut">
               <a:rPr lang="en-US" smtClean="0"/>
-              <a:t>11/28/18</a:t>
+              <a:t>11/29/2018</a:t>
             </a:fld>
             <a:endParaRPr lang="en-US"/>
           </a:p>
@@ -1394,10 +1692,9 @@
           </a:lstStyle>
           <a:p>
             <a:r>
-              <a:rPr lang="en-US" smtClean="0"/>
+              <a:rPr lang="en-US"/>
               <a:t>Click to edit Master title style</a:t>
             </a:r>
-            <a:endParaRPr lang="en-US"/>
           </a:p>
         </p:txBody>
       </p:sp>
@@ -1514,7 +1811,7 @@
           <a:p>
             <a:pPr lvl="0"/>
             <a:r>
-              <a:rPr lang="en-US" smtClean="0"/>
+              <a:rPr lang="en-US"/>
               <a:t>Click to edit Master text styles</a:t>
             </a:r>
           </a:p>
@@ -1537,7 +1834,7 @@
           <a:p>
             <a:fld id="{DC7CFDF0-330C-CD4E-97ED-63819D162666}" type="datetimeFigureOut">
               <a:rPr lang="en-US" smtClean="0"/>
-              <a:t>11/28/18</a:t>
+              <a:t>11/29/2018</a:t>
             </a:fld>
             <a:endParaRPr lang="en-US"/>
           </a:p>
@@ -1631,10 +1928,9 @@
           <a:lstStyle/>
           <a:p>
             <a:r>
-              <a:rPr lang="en-US" smtClean="0"/>
+              <a:rPr lang="en-US"/>
               <a:t>Click to edit Master title style</a:t>
             </a:r>
-            <a:endParaRPr lang="en-US"/>
           </a:p>
         </p:txBody>
       </p:sp>
@@ -1660,38 +1956,37 @@
           <a:p>
             <a:pPr lvl="0"/>
             <a:r>
-              <a:rPr lang="en-US" smtClean="0"/>
+              <a:rPr lang="en-US"/>
               <a:t>Click to edit Master text styles</a:t>
             </a:r>
           </a:p>
           <a:p>
             <a:pPr lvl="1"/>
             <a:r>
-              <a:rPr lang="en-US" smtClean="0"/>
+              <a:rPr lang="en-US"/>
               <a:t>Second level</a:t>
             </a:r>
           </a:p>
           <a:p>
             <a:pPr lvl="2"/>
             <a:r>
-              <a:rPr lang="en-US" smtClean="0"/>
+              <a:rPr lang="en-US"/>
               <a:t>Third level</a:t>
             </a:r>
           </a:p>
           <a:p>
             <a:pPr lvl="3"/>
             <a:r>
-              <a:rPr lang="en-US" smtClean="0"/>
+              <a:rPr lang="en-US"/>
               <a:t>Fourth level</a:t>
             </a:r>
           </a:p>
           <a:p>
             <a:pPr lvl="4"/>
             <a:r>
-              <a:rPr lang="en-US" smtClean="0"/>
+              <a:rPr lang="en-US"/>
               <a:t>Fifth level</a:t>
             </a:r>
-            <a:endParaRPr lang="en-US"/>
           </a:p>
         </p:txBody>
       </p:sp>
@@ -1717,38 +2012,37 @@
           <a:p>
             <a:pPr lvl="0"/>
             <a:r>
-              <a:rPr lang="en-US" smtClean="0"/>
+              <a:rPr lang="en-US"/>
               <a:t>Click to edit Master text styles</a:t>
             </a:r>
           </a:p>
           <a:p>
             <a:pPr lvl="1"/>
             <a:r>
-              <a:rPr lang="en-US" smtClean="0"/>
+              <a:rPr lang="en-US"/>
               <a:t>Second level</a:t>
             </a:r>
           </a:p>
           <a:p>
             <a:pPr lvl="2"/>
             <a:r>
-              <a:rPr lang="en-US" smtClean="0"/>
+              <a:rPr lang="en-US"/>
               <a:t>Third level</a:t>
             </a:r>
           </a:p>
           <a:p>
             <a:pPr lvl="3"/>
             <a:r>
-              <a:rPr lang="en-US" smtClean="0"/>
+              <a:rPr lang="en-US"/>
               <a:t>Fourth level</a:t>
             </a:r>
           </a:p>
           <a:p>
             <a:pPr lvl="4"/>
             <a:r>
-              <a:rPr lang="en-US" smtClean="0"/>
+              <a:rPr lang="en-US"/>
               <a:t>Fifth level</a:t>
             </a:r>
-            <a:endParaRPr lang="en-US"/>
           </a:p>
         </p:txBody>
       </p:sp>
@@ -1769,7 +2063,7 @@
           <a:p>
             <a:fld id="{DC7CFDF0-330C-CD4E-97ED-63819D162666}" type="datetimeFigureOut">
               <a:rPr lang="en-US" smtClean="0"/>
-              <a:t>11/28/18</a:t>
+              <a:t>11/29/2018</a:t>
             </a:fld>
             <a:endParaRPr lang="en-US"/>
           </a:p>
@@ -1868,10 +2162,9 @@
           <a:lstStyle/>
           <a:p>
             <a:r>
-              <a:rPr lang="en-US" smtClean="0"/>
+              <a:rPr lang="en-US"/>
               <a:t>Click to edit Master title style</a:t>
             </a:r>
-            <a:endParaRPr lang="en-US"/>
           </a:p>
         </p:txBody>
       </p:sp>
@@ -1934,7 +2227,7 @@
           <a:p>
             <a:pPr lvl="0"/>
             <a:r>
-              <a:rPr lang="en-US" smtClean="0"/>
+              <a:rPr lang="en-US"/>
               <a:t>Click to edit Master text styles</a:t>
             </a:r>
           </a:p>
@@ -1962,38 +2255,37 @@
           <a:p>
             <a:pPr lvl="0"/>
             <a:r>
-              <a:rPr lang="en-US" smtClean="0"/>
+              <a:rPr lang="en-US"/>
               <a:t>Click to edit Master text styles</a:t>
             </a:r>
           </a:p>
           <a:p>
             <a:pPr lvl="1"/>
             <a:r>
-              <a:rPr lang="en-US" smtClean="0"/>
+              <a:rPr lang="en-US"/>
               <a:t>Second level</a:t>
             </a:r>
           </a:p>
           <a:p>
             <a:pPr lvl="2"/>
             <a:r>
-              <a:rPr lang="en-US" smtClean="0"/>
+              <a:rPr lang="en-US"/>
               <a:t>Third level</a:t>
             </a:r>
           </a:p>
           <a:p>
             <a:pPr lvl="3"/>
             <a:r>
-              <a:rPr lang="en-US" smtClean="0"/>
+              <a:rPr lang="en-US"/>
               <a:t>Fourth level</a:t>
             </a:r>
           </a:p>
           <a:p>
             <a:pPr lvl="4"/>
             <a:r>
-              <a:rPr lang="en-US" smtClean="0"/>
+              <a:rPr lang="en-US"/>
               <a:t>Fifth level</a:t>
             </a:r>
-            <a:endParaRPr lang="en-US"/>
           </a:p>
         </p:txBody>
       </p:sp>
@@ -2056,7 +2348,7 @@
           <a:p>
             <a:pPr lvl="0"/>
             <a:r>
-              <a:rPr lang="en-US" smtClean="0"/>
+              <a:rPr lang="en-US"/>
               <a:t>Click to edit Master text styles</a:t>
             </a:r>
           </a:p>
@@ -2084,38 +2376,37 @@
           <a:p>
             <a:pPr lvl="0"/>
             <a:r>
-              <a:rPr lang="en-US" smtClean="0"/>
+              <a:rPr lang="en-US"/>
               <a:t>Click to edit Master text styles</a:t>
             </a:r>
           </a:p>
           <a:p>
             <a:pPr lvl="1"/>
             <a:r>
-              <a:rPr lang="en-US" smtClean="0"/>
+              <a:rPr lang="en-US"/>
               <a:t>Second level</a:t>
             </a:r>
           </a:p>
           <a:p>
             <a:pPr lvl="2"/>
             <a:r>
-              <a:rPr lang="en-US" smtClean="0"/>
+              <a:rPr lang="en-US"/>
               <a:t>Third level</a:t>
             </a:r>
           </a:p>
           <a:p>
             <a:pPr lvl="3"/>
             <a:r>
-              <a:rPr lang="en-US" smtClean="0"/>
+              <a:rPr lang="en-US"/>
               <a:t>Fourth level</a:t>
             </a:r>
           </a:p>
           <a:p>
             <a:pPr lvl="4"/>
             <a:r>
-              <a:rPr lang="en-US" smtClean="0"/>
+              <a:rPr lang="en-US"/>
               <a:t>Fifth level</a:t>
             </a:r>
-            <a:endParaRPr lang="en-US"/>
           </a:p>
         </p:txBody>
       </p:sp>
@@ -2136,7 +2427,7 @@
           <a:p>
             <a:fld id="{DC7CFDF0-330C-CD4E-97ED-63819D162666}" type="datetimeFigureOut">
               <a:rPr lang="en-US" smtClean="0"/>
-              <a:t>11/28/18</a:t>
+              <a:t>11/29/2018</a:t>
             </a:fld>
             <a:endParaRPr lang="en-US"/>
           </a:p>
@@ -2230,10 +2521,9 @@
           <a:lstStyle/>
           <a:p>
             <a:r>
-              <a:rPr lang="en-US" smtClean="0"/>
+              <a:rPr lang="en-US"/>
               <a:t>Click to edit Master title style</a:t>
             </a:r>
-            <a:endParaRPr lang="en-US"/>
           </a:p>
         </p:txBody>
       </p:sp>
@@ -2254,7 +2544,7 @@
           <a:p>
             <a:fld id="{DC7CFDF0-330C-CD4E-97ED-63819D162666}" type="datetimeFigureOut">
               <a:rPr lang="en-US" smtClean="0"/>
-              <a:t>11/28/18</a:t>
+              <a:t>11/29/2018</a:t>
             </a:fld>
             <a:endParaRPr lang="en-US"/>
           </a:p>
@@ -2349,7 +2639,7 @@
           <a:p>
             <a:fld id="{DC7CFDF0-330C-CD4E-97ED-63819D162666}" type="datetimeFigureOut">
               <a:rPr lang="en-US" smtClean="0"/>
-              <a:t>11/28/18</a:t>
+              <a:t>11/29/2018</a:t>
             </a:fld>
             <a:endParaRPr lang="en-US"/>
           </a:p>
@@ -2452,10 +2742,9 @@
           </a:lstStyle>
           <a:p>
             <a:r>
-              <a:rPr lang="en-US" smtClean="0"/>
+              <a:rPr lang="en-US"/>
               <a:t>Click to edit Master title style</a:t>
             </a:r>
-            <a:endParaRPr lang="en-US"/>
           </a:p>
         </p:txBody>
       </p:sp>
@@ -2509,38 +2798,37 @@
           <a:p>
             <a:pPr lvl="0"/>
             <a:r>
-              <a:rPr lang="en-US" smtClean="0"/>
+              <a:rPr lang="en-US"/>
               <a:t>Click to edit Master text styles</a:t>
             </a:r>
           </a:p>
           <a:p>
             <a:pPr lvl="1"/>
             <a:r>
-              <a:rPr lang="en-US" smtClean="0"/>
+              <a:rPr lang="en-US"/>
               <a:t>Second level</a:t>
             </a:r>
           </a:p>
           <a:p>
             <a:pPr lvl="2"/>
             <a:r>
-              <a:rPr lang="en-US" smtClean="0"/>
+              <a:rPr lang="en-US"/>
               <a:t>Third level</a:t>
             </a:r>
           </a:p>
           <a:p>
             <a:pPr lvl="3"/>
             <a:r>
-              <a:rPr lang="en-US" smtClean="0"/>
+              <a:rPr lang="en-US"/>
               <a:t>Fourth level</a:t>
             </a:r>
           </a:p>
           <a:p>
             <a:pPr lvl="4"/>
             <a:r>
-              <a:rPr lang="en-US" smtClean="0"/>
+              <a:rPr lang="en-US"/>
               <a:t>Fifth level</a:t>
             </a:r>
-            <a:endParaRPr lang="en-US"/>
           </a:p>
         </p:txBody>
       </p:sp>
@@ -2603,7 +2891,7 @@
           <a:p>
             <a:pPr lvl="0"/>
             <a:r>
-              <a:rPr lang="en-US" smtClean="0"/>
+              <a:rPr lang="en-US"/>
               <a:t>Click to edit Master text styles</a:t>
             </a:r>
           </a:p>
@@ -2626,7 +2914,7 @@
           <a:p>
             <a:fld id="{DC7CFDF0-330C-CD4E-97ED-63819D162666}" type="datetimeFigureOut">
               <a:rPr lang="en-US" smtClean="0"/>
-              <a:t>11/28/18</a:t>
+              <a:t>11/29/2018</a:t>
             </a:fld>
             <a:endParaRPr lang="en-US"/>
           </a:p>
@@ -2729,10 +3017,9 @@
           </a:lstStyle>
           <a:p>
             <a:r>
-              <a:rPr lang="en-US" smtClean="0"/>
+              <a:rPr lang="en-US"/>
               <a:t>Click to edit Master title style</a:t>
             </a:r>
-            <a:endParaRPr lang="en-US"/>
           </a:p>
         </p:txBody>
       </p:sp>
@@ -2856,7 +3143,7 @@
           <a:p>
             <a:pPr lvl="0"/>
             <a:r>
-              <a:rPr lang="en-US" smtClean="0"/>
+              <a:rPr lang="en-US"/>
               <a:t>Click to edit Master text styles</a:t>
             </a:r>
           </a:p>
@@ -2879,7 +3166,7 @@
           <a:p>
             <a:fld id="{DC7CFDF0-330C-CD4E-97ED-63819D162666}" type="datetimeFigureOut">
               <a:rPr lang="en-US" smtClean="0"/>
-              <a:t>11/28/18</a:t>
+              <a:t>11/29/2018</a:t>
             </a:fld>
             <a:endParaRPr lang="en-US"/>
           </a:p>
@@ -2988,10 +3275,9 @@
           <a:lstStyle/>
           <a:p>
             <a:r>
-              <a:rPr lang="en-US" smtClean="0"/>
+              <a:rPr lang="en-US"/>
               <a:t>Click to edit Master title style</a:t>
             </a:r>
-            <a:endParaRPr lang="en-US"/>
           </a:p>
         </p:txBody>
       </p:sp>
@@ -3022,38 +3308,37 @@
           <a:p>
             <a:pPr lvl="0"/>
             <a:r>
-              <a:rPr lang="en-US" smtClean="0"/>
+              <a:rPr lang="en-US"/>
               <a:t>Click to edit Master text styles</a:t>
             </a:r>
           </a:p>
           <a:p>
             <a:pPr lvl="1"/>
             <a:r>
-              <a:rPr lang="en-US" smtClean="0"/>
+              <a:rPr lang="en-US"/>
               <a:t>Second level</a:t>
             </a:r>
           </a:p>
           <a:p>
             <a:pPr lvl="2"/>
             <a:r>
-              <a:rPr lang="en-US" smtClean="0"/>
+              <a:rPr lang="en-US"/>
               <a:t>Third level</a:t>
             </a:r>
           </a:p>
           <a:p>
             <a:pPr lvl="3"/>
             <a:r>
-              <a:rPr lang="en-US" smtClean="0"/>
+              <a:rPr lang="en-US"/>
               <a:t>Fourth level</a:t>
             </a:r>
           </a:p>
           <a:p>
             <a:pPr lvl="4"/>
             <a:r>
-              <a:rPr lang="en-US" smtClean="0"/>
+              <a:rPr lang="en-US"/>
               <a:t>Fifth level</a:t>
             </a:r>
-            <a:endParaRPr lang="en-US"/>
           </a:p>
         </p:txBody>
       </p:sp>
@@ -3092,7 +3377,7 @@
           <a:p>
             <a:fld id="{DC7CFDF0-330C-CD4E-97ED-63819D162666}" type="datetimeFigureOut">
               <a:rPr lang="en-US" smtClean="0"/>
-              <a:t>11/28/18</a:t>
+              <a:t>11/29/2018</a:t>
             </a:fld>
             <a:endParaRPr lang="en-US"/>
           </a:p>
@@ -3499,6 +3784,380 @@
       </p:grpSpPr>
       <p:sp>
         <p:nvSpPr>
+          <p:cNvPr id="2" name="Title 1">
+            <a:extLst>
+              <a:ext uri="{FF2B5EF4-FFF2-40B4-BE49-F238E27FC236}">
+                <a16:creationId xmlns:a16="http://schemas.microsoft.com/office/drawing/2014/main" id="{82DFB4A3-68B1-4FB4-AC1D-1645C6AC3903}"/>
+              </a:ext>
+            </a:extLst>
+          </p:cNvPr>
+          <p:cNvSpPr>
+            <a:spLocks noGrp="1"/>
+          </p:cNvSpPr>
+          <p:nvPr>
+            <p:ph type="ctrTitle"/>
+          </p:nvPr>
+        </p:nvSpPr>
+        <p:spPr/>
+        <p:txBody>
+          <a:bodyPr/>
+          <a:lstStyle/>
+          <a:p>
+            <a:r>
+              <a:rPr lang="en-US" dirty="0">
+                <a:cs typeface="Calibri Light"/>
+              </a:rPr>
+              <a:t>Predicting NCAA Football Games</a:t>
+            </a:r>
+            <a:endParaRPr lang="en-US" dirty="0"/>
+          </a:p>
+        </p:txBody>
+      </p:sp>
+      <p:sp>
+        <p:nvSpPr>
+          <p:cNvPr id="3" name="Subtitle 2">
+            <a:extLst>
+              <a:ext uri="{FF2B5EF4-FFF2-40B4-BE49-F238E27FC236}">
+                <a16:creationId xmlns:a16="http://schemas.microsoft.com/office/drawing/2014/main" id="{28A14AAF-6BDC-49FF-AC11-95237C1FA6B5}"/>
+              </a:ext>
+            </a:extLst>
+          </p:cNvPr>
+          <p:cNvSpPr>
+            <a:spLocks noGrp="1"/>
+          </p:cNvSpPr>
+          <p:nvPr>
+            <p:ph type="subTitle" idx="1"/>
+          </p:nvPr>
+        </p:nvSpPr>
+        <p:spPr/>
+        <p:txBody>
+          <a:bodyPr vert="horz" lIns="91440" tIns="45720" rIns="91440" bIns="45720" rtlCol="0" anchor="t">
+            <a:normAutofit/>
+          </a:bodyPr>
+          <a:lstStyle/>
+          <a:p>
+            <a:r>
+              <a:rPr lang="en-US" dirty="0">
+                <a:cs typeface="Calibri"/>
+              </a:rPr>
+              <a:t>Chi </a:t>
+            </a:r>
+            <a:r>
+              <a:rPr lang="en-US" dirty="0" err="1">
+                <a:cs typeface="Calibri"/>
+              </a:rPr>
+              <a:t>Jin</a:t>
+            </a:r>
+            <a:r>
+              <a:rPr lang="en-US" dirty="0">
+                <a:cs typeface="Calibri"/>
+              </a:rPr>
+              <a:t> &amp; Connor Masini</a:t>
+            </a:r>
+            <a:endParaRPr lang="en-US" dirty="0"/>
+          </a:p>
+        </p:txBody>
+      </p:sp>
+    </p:spTree>
+    <p:extLst>
+      <p:ext uri="{BB962C8B-B14F-4D97-AF65-F5344CB8AC3E}">
+        <p14:creationId xmlns:p14="http://schemas.microsoft.com/office/powerpoint/2010/main" val="3053653551"/>
+      </p:ext>
+    </p:extLst>
+  </p:cSld>
+  <p:clrMapOvr>
+    <a:masterClrMapping/>
+  </p:clrMapOvr>
+</p:sld>
+</file>
+
+<file path=ppt/slides/slide2.xml><?xml version="1.0" encoding="utf-8"?>
+<p:sld xmlns:a="http://schemas.openxmlformats.org/drawingml/2006/main" xmlns:r="http://schemas.openxmlformats.org/officeDocument/2006/relationships" xmlns:p="http://schemas.openxmlformats.org/presentationml/2006/main">
+  <p:cSld>
+    <p:spTree>
+      <p:nvGrpSpPr>
+        <p:cNvPr id="1" name=""/>
+        <p:cNvGrpSpPr/>
+        <p:nvPr/>
+      </p:nvGrpSpPr>
+      <p:grpSpPr>
+        <a:xfrm>
+          <a:off x="0" y="0"/>
+          <a:ext cx="0" cy="0"/>
+          <a:chOff x="0" y="0"/>
+          <a:chExt cx="0" cy="0"/>
+        </a:xfrm>
+      </p:grpSpPr>
+      <p:sp>
+        <p:nvSpPr>
+          <p:cNvPr id="2" name="Title 1">
+            <a:extLst>
+              <a:ext uri="{FF2B5EF4-FFF2-40B4-BE49-F238E27FC236}">
+                <a16:creationId xmlns:a16="http://schemas.microsoft.com/office/drawing/2014/main" id="{A5624086-7587-4A30-86E8-B6E94C50EC7E}"/>
+              </a:ext>
+            </a:extLst>
+          </p:cNvPr>
+          <p:cNvSpPr>
+            <a:spLocks noGrp="1"/>
+          </p:cNvSpPr>
+          <p:nvPr>
+            <p:ph type="title"/>
+          </p:nvPr>
+        </p:nvSpPr>
+        <p:spPr/>
+        <p:txBody>
+          <a:bodyPr/>
+          <a:lstStyle/>
+          <a:p>
+            <a:r>
+              <a:rPr lang="en-US" dirty="0">
+                <a:cs typeface="Calibri Light"/>
+              </a:rPr>
+              <a:t>Problem Overview</a:t>
+            </a:r>
+            <a:endParaRPr lang="en-US" dirty="0"/>
+          </a:p>
+        </p:txBody>
+      </p:sp>
+      <p:sp>
+        <p:nvSpPr>
+          <p:cNvPr id="3" name="Content Placeholder 2">
+            <a:extLst>
+              <a:ext uri="{FF2B5EF4-FFF2-40B4-BE49-F238E27FC236}">
+                <a16:creationId xmlns:a16="http://schemas.microsoft.com/office/drawing/2014/main" id="{93CEA45F-C19F-4939-A6DA-108762FEF866}"/>
+              </a:ext>
+            </a:extLst>
+          </p:cNvPr>
+          <p:cNvSpPr>
+            <a:spLocks noGrp="1"/>
+          </p:cNvSpPr>
+          <p:nvPr>
+            <p:ph idx="1"/>
+          </p:nvPr>
+        </p:nvSpPr>
+        <p:spPr/>
+        <p:txBody>
+          <a:bodyPr vert="horz" lIns="91440" tIns="45720" rIns="91440" bIns="45720" rtlCol="0" anchor="t">
+            <a:normAutofit/>
+          </a:bodyPr>
+          <a:lstStyle/>
+          <a:p>
+            <a:r>
+              <a:rPr lang="en-US" dirty="0">
+                <a:cs typeface="Calibri"/>
+              </a:rPr>
+              <a:t>Predict the scores of NCAA football games using a neural network with parameters evolved by a genetic algorithm</a:t>
+            </a:r>
+          </a:p>
+          <a:p>
+            <a:r>
+              <a:rPr lang="en-US" dirty="0">
+                <a:cs typeface="Calibri"/>
+              </a:rPr>
+              <a:t>Particularly difficult due to the high rate of player turnover each year</a:t>
+            </a:r>
+          </a:p>
+          <a:p>
+            <a:r>
+              <a:rPr lang="en-US" dirty="0">
+                <a:cs typeface="Calibri"/>
+              </a:rPr>
+              <a:t>Want to optimize 3 different statistics:</a:t>
+            </a:r>
+          </a:p>
+          <a:p>
+            <a:r>
+              <a:rPr lang="en-US" dirty="0">
+                <a:cs typeface="Calibri"/>
+              </a:rPr>
+              <a:t>Straight Up: Which team wins the game</a:t>
+            </a:r>
+          </a:p>
+          <a:p>
+            <a:r>
+              <a:rPr lang="en-US" dirty="0">
+                <a:cs typeface="Calibri"/>
+              </a:rPr>
+              <a:t>Spread: Point differential between the two teams</a:t>
+            </a:r>
+          </a:p>
+          <a:p>
+            <a:r>
+              <a:rPr lang="en-US" dirty="0">
+                <a:cs typeface="Calibri"/>
+              </a:rPr>
+              <a:t>Over/Under: Total number of points scored by the two teams</a:t>
+            </a:r>
+          </a:p>
+        </p:txBody>
+      </p:sp>
+    </p:spTree>
+    <p:extLst>
+      <p:ext uri="{BB962C8B-B14F-4D97-AF65-F5344CB8AC3E}">
+        <p14:creationId xmlns:p14="http://schemas.microsoft.com/office/powerpoint/2010/main" val="3523354900"/>
+      </p:ext>
+    </p:extLst>
+  </p:cSld>
+  <p:clrMapOvr>
+    <a:masterClrMapping/>
+  </p:clrMapOvr>
+</p:sld>
+</file>
+
+<file path=ppt/slides/slide3.xml><?xml version="1.0" encoding="utf-8"?>
+<p:sld xmlns:a="http://schemas.openxmlformats.org/drawingml/2006/main" xmlns:r="http://schemas.openxmlformats.org/officeDocument/2006/relationships" xmlns:p="http://schemas.openxmlformats.org/presentationml/2006/main">
+  <p:cSld>
+    <p:spTree>
+      <p:nvGrpSpPr>
+        <p:cNvPr id="1" name=""/>
+        <p:cNvGrpSpPr/>
+        <p:nvPr/>
+      </p:nvGrpSpPr>
+      <p:grpSpPr>
+        <a:xfrm>
+          <a:off x="0" y="0"/>
+          <a:ext cx="0" cy="0"/>
+          <a:chOff x="0" y="0"/>
+          <a:chExt cx="0" cy="0"/>
+        </a:xfrm>
+      </p:grpSpPr>
+      <p:sp>
+        <p:nvSpPr>
+          <p:cNvPr id="2" name="Title 1">
+            <a:extLst>
+              <a:ext uri="{FF2B5EF4-FFF2-40B4-BE49-F238E27FC236}">
+                <a16:creationId xmlns:a16="http://schemas.microsoft.com/office/drawing/2014/main" id="{F7942215-CB3B-4F41-8B85-241EEF04CBA9}"/>
+              </a:ext>
+            </a:extLst>
+          </p:cNvPr>
+          <p:cNvSpPr>
+            <a:spLocks noGrp="1"/>
+          </p:cNvSpPr>
+          <p:nvPr>
+            <p:ph type="title"/>
+          </p:nvPr>
+        </p:nvSpPr>
+        <p:spPr/>
+        <p:txBody>
+          <a:bodyPr/>
+          <a:lstStyle/>
+          <a:p>
+            <a:r>
+              <a:rPr lang="en-US" dirty="0">
+                <a:cs typeface="Calibri Light"/>
+              </a:rPr>
+              <a:t>Dataset</a:t>
+            </a:r>
+            <a:endParaRPr lang="en-US" dirty="0"/>
+          </a:p>
+        </p:txBody>
+      </p:sp>
+      <p:sp>
+        <p:nvSpPr>
+          <p:cNvPr id="3" name="Content Placeholder 2">
+            <a:extLst>
+              <a:ext uri="{FF2B5EF4-FFF2-40B4-BE49-F238E27FC236}">
+                <a16:creationId xmlns:a16="http://schemas.microsoft.com/office/drawing/2014/main" id="{B0F17705-6B42-4A5B-A3EE-6A052D7E1874}"/>
+              </a:ext>
+            </a:extLst>
+          </p:cNvPr>
+          <p:cNvSpPr>
+            <a:spLocks noGrp="1"/>
+          </p:cNvSpPr>
+          <p:nvPr>
+            <p:ph idx="1"/>
+          </p:nvPr>
+        </p:nvSpPr>
+        <p:spPr/>
+        <p:txBody>
+          <a:bodyPr vert="horz" lIns="91440" tIns="45720" rIns="91440" bIns="45720" rtlCol="0" anchor="t">
+            <a:normAutofit/>
+          </a:bodyPr>
+          <a:lstStyle/>
+          <a:p>
+            <a:r>
+              <a:rPr lang="en-US" dirty="0">
+                <a:cs typeface="Calibri"/>
+              </a:rPr>
+              <a:t>Data was taken from Seldom Used Reserve</a:t>
+            </a:r>
+          </a:p>
+          <a:p>
+            <a:r>
+              <a:rPr lang="en-US" dirty="0">
+                <a:cs typeface="Calibri"/>
+              </a:rPr>
+              <a:t>Included all games from the 2011-2018 seasons</a:t>
+            </a:r>
+          </a:p>
+          <a:p>
+            <a:r>
+              <a:rPr lang="en-US" dirty="0">
+                <a:cs typeface="Calibri"/>
+              </a:rPr>
+              <a:t>Used all basic box score average statistics from teams over a 2-year period</a:t>
+            </a:r>
+          </a:p>
+          <a:p>
+            <a:pPr lvl="1"/>
+            <a:r>
+              <a:rPr lang="en-US" dirty="0">
+                <a:cs typeface="Calibri"/>
+              </a:rPr>
+              <a:t>Ex. Rushing yards, number of turnovers, yards allowed, etc.</a:t>
+            </a:r>
+          </a:p>
+          <a:p>
+            <a:r>
+              <a:rPr lang="en-US" dirty="0">
+                <a:cs typeface="Calibri"/>
+              </a:rPr>
+              <a:t>Also generated some statistics that have been found to be indicative of team success</a:t>
+            </a:r>
+          </a:p>
+          <a:p>
+            <a:pPr lvl="1"/>
+            <a:r>
+              <a:rPr lang="en-US" dirty="0">
+                <a:cs typeface="Calibri"/>
+              </a:rPr>
+              <a:t>RPI, Strength of Schedule, Glicko, etc.</a:t>
+            </a:r>
+          </a:p>
+        </p:txBody>
+      </p:sp>
+    </p:spTree>
+    <p:extLst>
+      <p:ext uri="{BB962C8B-B14F-4D97-AF65-F5344CB8AC3E}">
+        <p14:creationId xmlns:p14="http://schemas.microsoft.com/office/powerpoint/2010/main" val="3366713997"/>
+      </p:ext>
+    </p:extLst>
+  </p:cSld>
+  <p:clrMapOvr>
+    <a:masterClrMapping/>
+  </p:clrMapOvr>
+</p:sld>
+</file>
+
+<file path=ppt/slides/slide4.xml><?xml version="1.0" encoding="utf-8"?>
+<p:sld xmlns:a="http://schemas.openxmlformats.org/drawingml/2006/main" xmlns:r="http://schemas.openxmlformats.org/officeDocument/2006/relationships" xmlns:p="http://schemas.openxmlformats.org/presentationml/2006/main">
+  <p:cSld>
+    <p:spTree>
+      <p:nvGrpSpPr>
+        <p:cNvPr id="1" name=""/>
+        <p:cNvGrpSpPr/>
+        <p:nvPr/>
+      </p:nvGrpSpPr>
+      <p:grpSpPr>
+        <a:xfrm>
+          <a:off x="0" y="0"/>
+          <a:ext cx="0" cy="0"/>
+          <a:chOff x="0" y="0"/>
+          <a:chExt cx="0" cy="0"/>
+        </a:xfrm>
+      </p:grpSpPr>
+      <p:sp>
+        <p:nvSpPr>
           <p:cNvPr id="5" name="TextBox 4"/>
           <p:cNvSpPr txBox="1"/>
           <p:nvPr/>
@@ -3520,14 +4179,11 @@
           <a:lstStyle/>
           <a:p>
             <a:r>
-              <a:rPr lang="en-US" sz="4000" b="1" dirty="0" smtClean="0">
+              <a:rPr lang="en-US" sz="4000" b="1" dirty="0">
                 <a:latin typeface="+mj-lt"/>
               </a:rPr>
               <a:t>Multilayer Perceptron Model</a:t>
             </a:r>
-            <a:endParaRPr lang="en-US" sz="4000" b="1" dirty="0">
-              <a:latin typeface="+mj-lt"/>
-            </a:endParaRPr>
           </a:p>
         </p:txBody>
       </p:sp>
@@ -3539,7 +4195,7 @@
         </p:nvSpPr>
         <p:spPr>
           <a:xfrm>
-            <a:off x="600091" y="1708240"/>
+            <a:off x="549291" y="2334773"/>
             <a:ext cx="807573" cy="2378110"/>
           </a:xfrm>
           <a:prstGeom prst="rect">
@@ -3587,7 +4243,7 @@
         </p:nvSpPr>
         <p:spPr>
           <a:xfrm>
-            <a:off x="304596" y="4285433"/>
+            <a:off x="253796" y="4911966"/>
             <a:ext cx="1625600" cy="461665"/>
           </a:xfrm>
           <a:prstGeom prst="rect">
@@ -3602,10 +4258,9 @@
           <a:lstStyle/>
           <a:p>
             <a:r>
-              <a:rPr lang="en-US" sz="2400" dirty="0" smtClean="0"/>
+              <a:rPr lang="en-US" sz="2400" dirty="0"/>
               <a:t>input layer</a:t>
             </a:r>
-            <a:endParaRPr lang="en-US" sz="2400" dirty="0"/>
           </a:p>
         </p:txBody>
       </p:sp>
@@ -3617,7 +4272,7 @@
         </p:nvGrpSpPr>
         <p:grpSpPr>
           <a:xfrm>
-            <a:off x="2554683" y="1708239"/>
+            <a:off x="2503883" y="2334772"/>
             <a:ext cx="791271" cy="2418069"/>
             <a:chOff x="3144569" y="1266667"/>
             <a:chExt cx="1275552" cy="3897999"/>
@@ -3952,7 +4607,7 @@
         </p:nvGrpSpPr>
         <p:grpSpPr>
           <a:xfrm>
-            <a:off x="6521241" y="2690026"/>
+            <a:off x="6470441" y="3316559"/>
             <a:ext cx="1028429" cy="179276"/>
             <a:chOff x="6096000" y="2671799"/>
             <a:chExt cx="1028429" cy="179276"/>
@@ -4096,7 +4751,7 @@
         </p:nvSpPr>
         <p:spPr>
           <a:xfrm>
-            <a:off x="1601322" y="2554153"/>
+            <a:off x="1550522" y="3180686"/>
             <a:ext cx="714867" cy="409952"/>
           </a:xfrm>
           <a:prstGeom prst="rightArrow">
@@ -4136,7 +4791,7 @@
         </p:nvSpPr>
         <p:spPr>
           <a:xfrm>
-            <a:off x="3638455" y="2554153"/>
+            <a:off x="3587655" y="3180686"/>
             <a:ext cx="714867" cy="409952"/>
           </a:xfrm>
           <a:prstGeom prst="rightArrow">
@@ -4176,7 +4831,7 @@
         </p:nvSpPr>
         <p:spPr>
           <a:xfrm>
-            <a:off x="5614799" y="2554153"/>
+            <a:off x="5563999" y="3180686"/>
             <a:ext cx="714867" cy="409952"/>
           </a:xfrm>
           <a:prstGeom prst="rightArrow">
@@ -4216,7 +4871,7 @@
         </p:nvSpPr>
         <p:spPr>
           <a:xfrm>
-            <a:off x="1973597" y="4570300"/>
+            <a:off x="1922797" y="5196833"/>
             <a:ext cx="1953441" cy="461665"/>
           </a:xfrm>
           <a:prstGeom prst="rect">
@@ -4231,10 +4886,9 @@
           <a:lstStyle/>
           <a:p>
             <a:r>
-              <a:rPr lang="en-US" sz="2400" dirty="0" smtClean="0"/>
+              <a:rPr lang="en-US" sz="2400" dirty="0"/>
               <a:t>hidden layer 1</a:t>
             </a:r>
-            <a:endParaRPr lang="en-US" sz="2400" dirty="0"/>
           </a:p>
         </p:txBody>
       </p:sp>
@@ -4246,7 +4900,7 @@
         </p:nvSpPr>
         <p:spPr>
           <a:xfrm>
-            <a:off x="9700511" y="2554153"/>
+            <a:off x="9649711" y="3180686"/>
             <a:ext cx="714867" cy="409952"/>
           </a:xfrm>
           <a:prstGeom prst="rightArrow">
@@ -4286,7 +4940,7 @@
         </p:nvGrpSpPr>
         <p:grpSpPr>
           <a:xfrm>
-            <a:off x="4572724" y="1763844"/>
+            <a:off x="4521924" y="2390377"/>
             <a:ext cx="791271" cy="2418069"/>
             <a:chOff x="3144569" y="1266667"/>
             <a:chExt cx="1275552" cy="3897999"/>
@@ -4621,7 +5275,7 @@
         </p:nvSpPr>
         <p:spPr>
           <a:xfrm>
-            <a:off x="7741245" y="2554153"/>
+            <a:off x="7690445" y="3180686"/>
             <a:ext cx="714867" cy="409952"/>
           </a:xfrm>
           <a:prstGeom prst="rightArrow">
@@ -4661,7 +5315,7 @@
         </p:nvGrpSpPr>
         <p:grpSpPr>
           <a:xfrm>
-            <a:off x="8721424" y="1708238"/>
+            <a:off x="8670624" y="2334771"/>
             <a:ext cx="791271" cy="2418069"/>
             <a:chOff x="3144569" y="1266667"/>
             <a:chExt cx="1275552" cy="3897999"/>
@@ -4996,7 +5650,7 @@
         </p:nvSpPr>
         <p:spPr>
           <a:xfrm>
-            <a:off x="10739465" y="2375832"/>
+            <a:off x="10688665" y="3002365"/>
             <a:ext cx="638159" cy="645053"/>
           </a:xfrm>
           <a:prstGeom prst="rect">
@@ -5044,7 +5698,7 @@
         </p:nvSpPr>
         <p:spPr>
           <a:xfrm>
-            <a:off x="3991638" y="4570300"/>
+            <a:off x="3940838" y="5196833"/>
             <a:ext cx="1953441" cy="461665"/>
           </a:xfrm>
           <a:prstGeom prst="rect">
@@ -5059,10 +5713,9 @@
           <a:lstStyle/>
           <a:p>
             <a:r>
-              <a:rPr lang="en-US" sz="2400" dirty="0" smtClean="0"/>
+              <a:rPr lang="en-US" sz="2400" dirty="0"/>
               <a:t>hidden layer 2</a:t>
             </a:r>
-            <a:endParaRPr lang="en-US" sz="2400" dirty="0"/>
           </a:p>
         </p:txBody>
       </p:sp>
@@ -5074,7 +5727,7 @@
         </p:nvSpPr>
         <p:spPr>
           <a:xfrm>
-            <a:off x="8140338" y="4549371"/>
+            <a:off x="8089538" y="5175904"/>
             <a:ext cx="1953441" cy="461665"/>
           </a:xfrm>
           <a:prstGeom prst="rect">
@@ -5089,10 +5742,9 @@
           <a:lstStyle/>
           <a:p>
             <a:r>
-              <a:rPr lang="en-US" sz="2400" dirty="0" smtClean="0"/>
+              <a:rPr lang="en-US" sz="2400" dirty="0"/>
               <a:t>hidden layer n</a:t>
             </a:r>
-            <a:endParaRPr lang="en-US" sz="2400" dirty="0"/>
           </a:p>
         </p:txBody>
       </p:sp>
@@ -5104,7 +5756,7 @@
         </p:nvSpPr>
         <p:spPr>
           <a:xfrm>
-            <a:off x="10319686" y="3295072"/>
+            <a:off x="10268886" y="3921605"/>
             <a:ext cx="1946256" cy="461665"/>
           </a:xfrm>
           <a:prstGeom prst="rect">
@@ -5119,10 +5771,9 @@
           <a:lstStyle/>
           <a:p>
             <a:r>
-              <a:rPr lang="en-US" sz="2400" dirty="0" smtClean="0"/>
+              <a:rPr lang="en-US" sz="2400" dirty="0"/>
               <a:t>output result</a:t>
             </a:r>
-            <a:endParaRPr lang="en-US" sz="2400" dirty="0"/>
           </a:p>
         </p:txBody>
       </p:sp>
@@ -5136,17 +5787,10 @@
   <p:clrMapOvr>
     <a:masterClrMapping/>
   </p:clrMapOvr>
-  <p:timing>
-    <p:tnLst>
-      <p:par>
-        <p:cTn xmlns:p14="http://schemas.microsoft.com/office/powerpoint/2010/main" id="1" dur="indefinite" restart="never" nodeType="tmRoot"/>
-      </p:par>
-    </p:tnLst>
-  </p:timing>
 </p:sld>
 </file>
 
-<file path=ppt/slides/slide2.xml><?xml version="1.0" encoding="utf-8"?>
+<file path=ppt/slides/slide5.xml><?xml version="1.0" encoding="utf-8"?>
 <p:sld xmlns:a="http://schemas.openxmlformats.org/drawingml/2006/main" xmlns:r="http://schemas.openxmlformats.org/officeDocument/2006/relationships" xmlns:p="http://schemas.openxmlformats.org/presentationml/2006/main">
   <p:cSld>
     <p:spTree>
@@ -5186,14 +5830,11 @@
           <a:lstStyle/>
           <a:p>
             <a:r>
-              <a:rPr lang="en-US" sz="4000" b="1" dirty="0" smtClean="0">
+              <a:rPr lang="en-US" sz="4000" b="1" dirty="0">
                 <a:latin typeface="+mj-lt"/>
               </a:rPr>
               <a:t>Hyper Parameters to Evolve</a:t>
             </a:r>
-            <a:endParaRPr lang="en-US" sz="4000" b="1" dirty="0">
-              <a:latin typeface="+mj-lt"/>
-            </a:endParaRPr>
           </a:p>
         </p:txBody>
       </p:sp>
@@ -5224,7 +5865,7 @@
               <a:buChar char="•"/>
             </a:pPr>
             <a:r>
-              <a:rPr lang="en-US" sz="3600" dirty="0" smtClean="0"/>
+              <a:rPr lang="en-US" sz="3600" dirty="0"/>
               <a:t># of neurons per layer</a:t>
             </a:r>
           </a:p>
@@ -5234,7 +5875,7 @@
               <a:buChar char="•"/>
             </a:pPr>
             <a:r>
-              <a:rPr lang="en-US" sz="3600" dirty="0" smtClean="0"/>
+              <a:rPr lang="en-US" sz="3600" dirty="0"/>
               <a:t># of layers</a:t>
             </a:r>
           </a:p>
@@ -5244,7 +5885,7 @@
               <a:buChar char="•"/>
             </a:pPr>
             <a:r>
-              <a:rPr lang="en-US" sz="3600" dirty="0" smtClean="0"/>
+              <a:rPr lang="en-US" sz="3600" dirty="0"/>
               <a:t>activation function</a:t>
             </a:r>
           </a:p>
@@ -5254,10 +5895,9 @@
               <a:buChar char="•"/>
             </a:pPr>
             <a:r>
-              <a:rPr lang="en-US" sz="3600" dirty="0" smtClean="0"/>
+              <a:rPr lang="en-US" sz="3600" dirty="0"/>
               <a:t>optimizer</a:t>
             </a:r>
-            <a:endParaRPr lang="en-US" sz="3600" dirty="0"/>
           </a:p>
         </p:txBody>
       </p:sp>
@@ -5271,17 +5911,10 @@
   <p:clrMapOvr>
     <a:masterClrMapping/>
   </p:clrMapOvr>
-  <p:timing>
-    <p:tnLst>
-      <p:par>
-        <p:cTn xmlns:p14="http://schemas.microsoft.com/office/powerpoint/2010/main" id="1" dur="indefinite" restart="never" nodeType="tmRoot"/>
-      </p:par>
-    </p:tnLst>
-  </p:timing>
 </p:sld>
 </file>
 
-<file path=ppt/slides/slide3.xml><?xml version="1.0" encoding="utf-8"?>
+<file path=ppt/slides/slide6.xml><?xml version="1.0" encoding="utf-8"?>
 <p:sld xmlns:a="http://schemas.openxmlformats.org/drawingml/2006/main" xmlns:r="http://schemas.openxmlformats.org/officeDocument/2006/relationships" xmlns:p="http://schemas.openxmlformats.org/presentationml/2006/main">
   <p:cSld>
     <p:spTree>
@@ -5321,10 +5954,9 @@
           <a:lstStyle/>
           <a:p>
             <a:r>
-              <a:rPr lang="en-US" sz="3600" dirty="0" smtClean="0"/>
+              <a:rPr lang="en-US" sz="3600" dirty="0"/>
               <a:t>Fitness Function</a:t>
             </a:r>
-            <a:endParaRPr lang="en-US" sz="3600" dirty="0"/>
           </a:p>
         </p:txBody>
       </p:sp>
@@ -5350,7 +5982,7 @@
           <a:graphicData uri="http://schemas.openxmlformats.org/presentationml/2006/ole">
             <mc:AlternateContent xmlns:mc="http://schemas.openxmlformats.org/markup-compatibility/2006">
               <mc:Choice xmlns:v="urn:schemas-microsoft-com:vml" Requires="v">
-                <p:oleObj spid="_x0000_s1027" name="Equation" r:id="rId3" imgW="127000" imgH="190500" progId="Equation.DSMT4">
+                <p:oleObj spid="_x0000_s1433" name="Equation" r:id="rId3" imgW="127000" imgH="190500" progId="Equation.DSMT4">
                   <p:embed/>
                 </p:oleObj>
               </mc:Choice>
@@ -5407,7 +6039,7 @@
           <a:graphicData uri="http://schemas.openxmlformats.org/presentationml/2006/ole">
             <mc:AlternateContent xmlns:mc="http://schemas.openxmlformats.org/markup-compatibility/2006">
               <mc:Choice xmlns:v="urn:schemas-microsoft-com:vml" Requires="v">
-                <p:oleObj spid="_x0000_s1028" name="Equation" r:id="rId5" imgW="3289300" imgH="889000" progId="Equation.DSMT4">
+                <p:oleObj spid="_x0000_s1434" name="Equation" r:id="rId5" imgW="3289300" imgH="889000" progId="Equation.DSMT4">
                   <p:embed/>
                 </p:oleObj>
               </mc:Choice>
@@ -5452,17 +6084,10 @@
   <p:clrMapOvr>
     <a:masterClrMapping/>
   </p:clrMapOvr>
-  <p:timing>
-    <p:tnLst>
-      <p:par>
-        <p:cTn xmlns:p14="http://schemas.microsoft.com/office/powerpoint/2010/main" id="1" dur="indefinite" restart="never" nodeType="tmRoot"/>
-      </p:par>
-    </p:tnLst>
-  </p:timing>
 </p:sld>
 </file>
 
-<file path=ppt/slides/slide4.xml><?xml version="1.0" encoding="utf-8"?>
+<file path=ppt/slides/slide7.xml><?xml version="1.0" encoding="utf-8"?>
 <p:sld xmlns:a="http://schemas.openxmlformats.org/drawingml/2006/main" xmlns:r="http://schemas.openxmlformats.org/officeDocument/2006/relationships" xmlns:p="http://schemas.openxmlformats.org/presentationml/2006/main">
   <p:cSld>
     <p:spTree>
@@ -5502,10 +6127,9 @@
           <a:lstStyle/>
           <a:p>
             <a:r>
-              <a:rPr lang="en-US" sz="4000" dirty="0" smtClean="0"/>
+              <a:rPr lang="en-US" sz="4000" dirty="0"/>
               <a:t>Resulting Accuracies</a:t>
             </a:r>
-            <a:endParaRPr lang="en-US" sz="4000" dirty="0"/>
           </a:p>
         </p:txBody>
       </p:sp>
@@ -5519,17 +6143,10 @@
   <p:clrMapOvr>
     <a:masterClrMapping/>
   </p:clrMapOvr>
-  <p:timing>
-    <p:tnLst>
-      <p:par>
-        <p:cTn xmlns:p14="http://schemas.microsoft.com/office/powerpoint/2010/main" id="1" dur="indefinite" restart="never" nodeType="tmRoot"/>
-      </p:par>
-    </p:tnLst>
-  </p:timing>
 </p:sld>
 </file>
 
-<file path=ppt/slides/slide5.xml><?xml version="1.0" encoding="utf-8"?>
+<file path=ppt/slides/slide8.xml><?xml version="1.0" encoding="utf-8"?>
 <p:sld xmlns:a="http://schemas.openxmlformats.org/drawingml/2006/main" xmlns:r="http://schemas.openxmlformats.org/officeDocument/2006/relationships" xmlns:p="http://schemas.openxmlformats.org/presentationml/2006/main">
   <p:cSld>
     <p:spTree>
@@ -5548,6 +6165,703 @@
       </p:grpSpPr>
       <p:sp>
         <p:nvSpPr>
+          <p:cNvPr id="2" name="Title 1">
+            <a:extLst>
+              <a:ext uri="{FF2B5EF4-FFF2-40B4-BE49-F238E27FC236}">
+                <a16:creationId xmlns:a16="http://schemas.microsoft.com/office/drawing/2014/main" id="{D3F650D5-FB13-405A-9F0C-3F357019BD1A}"/>
+              </a:ext>
+            </a:extLst>
+          </p:cNvPr>
+          <p:cNvSpPr>
+            <a:spLocks noGrp="1"/>
+          </p:cNvSpPr>
+          <p:nvPr>
+            <p:ph type="title"/>
+          </p:nvPr>
+        </p:nvSpPr>
+        <p:spPr/>
+        <p:txBody>
+          <a:bodyPr/>
+          <a:lstStyle/>
+          <a:p>
+            <a:r>
+              <a:rPr lang="en-US" dirty="0">
+                <a:cs typeface="Calibri Light"/>
+              </a:rPr>
+              <a:t>Conference Championships Case Study</a:t>
+            </a:r>
+            <a:endParaRPr lang="en-US" dirty="0"/>
+          </a:p>
+        </p:txBody>
+      </p:sp>
+      <p:graphicFrame>
+        <p:nvGraphicFramePr>
+          <p:cNvPr id="4" name="Table 4">
+            <a:extLst>
+              <a:ext uri="{FF2B5EF4-FFF2-40B4-BE49-F238E27FC236}">
+                <a16:creationId xmlns:a16="http://schemas.microsoft.com/office/drawing/2014/main" id="{770AFD70-F852-4F13-A4D5-88EAFD69D04E}"/>
+              </a:ext>
+            </a:extLst>
+          </p:cNvPr>
+          <p:cNvGraphicFramePr>
+            <a:graphicFrameLocks noGrp="1"/>
+          </p:cNvGraphicFramePr>
+          <p:nvPr>
+            <p:ph idx="1"/>
+            <p:extLst>
+              <p:ext uri="{D42A27DB-BD31-4B8C-83A1-F6EECF244321}">
+                <p14:modId xmlns:p14="http://schemas.microsoft.com/office/powerpoint/2010/main" val="3058785499"/>
+              </p:ext>
+            </p:extLst>
+          </p:nvPr>
+        </p:nvGraphicFramePr>
+        <p:xfrm>
+          <a:off x="838200" y="1825625"/>
+          <a:ext cx="10515594" cy="2494275"/>
+        </p:xfrm>
+        <a:graphic>
+          <a:graphicData uri="http://schemas.openxmlformats.org/drawingml/2006/table">
+            <a:tbl>
+              <a:tblPr firstRow="1" bandRow="1">
+                <a:tableStyleId>{5C22544A-7EE6-4342-B048-85BDC9FD1C3A}</a:tableStyleId>
+              </a:tblPr>
+              <a:tblGrid>
+                <a:gridCol w="1752599">
+                  <a:extLst>
+                    <a:ext uri="{9D8B030D-6E8A-4147-A177-3AD203B41FA5}">
+                      <a16:colId xmlns:a16="http://schemas.microsoft.com/office/drawing/2014/main" val="2666376302"/>
+                    </a:ext>
+                  </a:extLst>
+                </a:gridCol>
+                <a:gridCol w="1752599">
+                  <a:extLst>
+                    <a:ext uri="{9D8B030D-6E8A-4147-A177-3AD203B41FA5}">
+                      <a16:colId xmlns:a16="http://schemas.microsoft.com/office/drawing/2014/main" val="2435338318"/>
+                    </a:ext>
+                  </a:extLst>
+                </a:gridCol>
+                <a:gridCol w="1752599">
+                  <a:extLst>
+                    <a:ext uri="{9D8B030D-6E8A-4147-A177-3AD203B41FA5}">
+                      <a16:colId xmlns:a16="http://schemas.microsoft.com/office/drawing/2014/main" val="3171150453"/>
+                    </a:ext>
+                  </a:extLst>
+                </a:gridCol>
+                <a:gridCol w="1752599">
+                  <a:extLst>
+                    <a:ext uri="{9D8B030D-6E8A-4147-A177-3AD203B41FA5}">
+                      <a16:colId xmlns:a16="http://schemas.microsoft.com/office/drawing/2014/main" val="857784766"/>
+                    </a:ext>
+                  </a:extLst>
+                </a:gridCol>
+                <a:gridCol w="1752599">
+                  <a:extLst>
+                    <a:ext uri="{9D8B030D-6E8A-4147-A177-3AD203B41FA5}">
+                      <a16:colId xmlns:a16="http://schemas.microsoft.com/office/drawing/2014/main" val="2127437086"/>
+                    </a:ext>
+                  </a:extLst>
+                </a:gridCol>
+                <a:gridCol w="1752599">
+                  <a:extLst>
+                    <a:ext uri="{9D8B030D-6E8A-4147-A177-3AD203B41FA5}">
+                      <a16:colId xmlns:a16="http://schemas.microsoft.com/office/drawing/2014/main" val="3052524693"/>
+                    </a:ext>
+                  </a:extLst>
+                </a:gridCol>
+              </a:tblGrid>
+              <a:tr h="370840">
+                <a:tc>
+                  <a:txBody>
+                    <a:bodyPr/>
+                    <a:lstStyle/>
+                    <a:p>
+                      <a:r>
+                        <a:rPr lang="en-US" dirty="0"/>
+                        <a:t>Team 1</a:t>
+                      </a:r>
+                    </a:p>
+                  </a:txBody>
+                  <a:tcPr/>
+                </a:tc>
+                <a:tc>
+                  <a:txBody>
+                    <a:bodyPr/>
+                    <a:lstStyle/>
+                    <a:p>
+                      <a:r>
+                        <a:rPr lang="en-US" dirty="0"/>
+                        <a:t>Team 2</a:t>
+                      </a:r>
+                    </a:p>
+                  </a:txBody>
+                  <a:tcPr/>
+                </a:tc>
+                <a:tc>
+                  <a:txBody>
+                    <a:bodyPr/>
+                    <a:lstStyle/>
+                    <a:p>
+                      <a:r>
+                        <a:rPr lang="en-US" dirty="0"/>
+                        <a:t>Predicted Score</a:t>
+                      </a:r>
+                    </a:p>
+                  </a:txBody>
+                  <a:tcPr/>
+                </a:tc>
+                <a:tc>
+                  <a:txBody>
+                    <a:bodyPr/>
+                    <a:lstStyle/>
+                    <a:p>
+                      <a:r>
+                        <a:rPr lang="en-US" dirty="0"/>
+                        <a:t>Actual Score</a:t>
+                      </a:r>
+                    </a:p>
+                  </a:txBody>
+                  <a:tcPr/>
+                </a:tc>
+                <a:tc>
+                  <a:txBody>
+                    <a:bodyPr/>
+                    <a:lstStyle/>
+                    <a:p>
+                      <a:r>
+                        <a:rPr lang="en-US" dirty="0"/>
+                        <a:t>Predicted Over/Under</a:t>
+                      </a:r>
+                    </a:p>
+                  </a:txBody>
+                  <a:tcPr/>
+                </a:tc>
+                <a:tc>
+                  <a:txBody>
+                    <a:bodyPr/>
+                    <a:lstStyle/>
+                    <a:p>
+                      <a:pPr lvl="0">
+                        <a:buNone/>
+                      </a:pPr>
+                      <a:r>
+                        <a:rPr lang="en-US" dirty="0"/>
+                        <a:t>Actual Over/Under</a:t>
+                      </a:r>
+                    </a:p>
+                  </a:txBody>
+                  <a:tcPr/>
+                </a:tc>
+                <a:extLst>
+                  <a:ext uri="{0D108BD9-81ED-4DB2-BD59-A6C34878D82A}">
+                    <a16:rowId xmlns:a16="http://schemas.microsoft.com/office/drawing/2014/main" val="1324851357"/>
+                  </a:ext>
+                </a:extLst>
+              </a:tr>
+              <a:tr h="370840">
+                <a:tc>
+                  <a:txBody>
+                    <a:bodyPr/>
+                    <a:lstStyle/>
+                    <a:p>
+                      <a:r>
+                        <a:rPr lang="en-US" dirty="0"/>
+                        <a:t>Michigan</a:t>
+                      </a:r>
+                    </a:p>
+                  </a:txBody>
+                  <a:tcPr/>
+                </a:tc>
+                <a:tc>
+                  <a:txBody>
+                    <a:bodyPr/>
+                    <a:lstStyle/>
+                    <a:p>
+                      <a:r>
+                        <a:rPr lang="en-US" dirty="0"/>
+                        <a:t>Northwestern</a:t>
+                      </a:r>
+                    </a:p>
+                  </a:txBody>
+                  <a:tcPr/>
+                </a:tc>
+                <a:tc>
+                  <a:txBody>
+                    <a:bodyPr/>
+                    <a:lstStyle/>
+                    <a:p>
+                      <a:endParaRPr lang="en-US"/>
+                    </a:p>
+                  </a:txBody>
+                  <a:tcPr/>
+                </a:tc>
+                <a:tc>
+                  <a:txBody>
+                    <a:bodyPr/>
+                    <a:lstStyle/>
+                    <a:p>
+                      <a:endParaRPr lang="en-US"/>
+                    </a:p>
+                  </a:txBody>
+                  <a:tcPr/>
+                </a:tc>
+                <a:tc>
+                  <a:txBody>
+                    <a:bodyPr/>
+                    <a:lstStyle/>
+                    <a:p>
+                      <a:endParaRPr lang="en-US"/>
+                    </a:p>
+                  </a:txBody>
+                  <a:tcPr/>
+                </a:tc>
+                <a:tc>
+                  <a:txBody>
+                    <a:bodyPr/>
+                    <a:lstStyle/>
+                    <a:p>
+                      <a:pPr lvl="0">
+                        <a:buNone/>
+                      </a:pPr>
+                      <a:endParaRPr lang="en-US" dirty="0"/>
+                    </a:p>
+                  </a:txBody>
+                  <a:tcPr/>
+                </a:tc>
+                <a:extLst>
+                  <a:ext uri="{0D108BD9-81ED-4DB2-BD59-A6C34878D82A}">
+                    <a16:rowId xmlns:a16="http://schemas.microsoft.com/office/drawing/2014/main" val="961588081"/>
+                  </a:ext>
+                </a:extLst>
+              </a:tr>
+              <a:tr h="370840">
+                <a:tc>
+                  <a:txBody>
+                    <a:bodyPr/>
+                    <a:lstStyle/>
+                    <a:p>
+                      <a:r>
+                        <a:rPr lang="en-US" dirty="0"/>
+                        <a:t>Alabama</a:t>
+                      </a:r>
+                    </a:p>
+                  </a:txBody>
+                  <a:tcPr/>
+                </a:tc>
+                <a:tc>
+                  <a:txBody>
+                    <a:bodyPr/>
+                    <a:lstStyle/>
+                    <a:p>
+                      <a:r>
+                        <a:rPr lang="en-US" dirty="0"/>
+                        <a:t>Georgia</a:t>
+                      </a:r>
+                    </a:p>
+                  </a:txBody>
+                  <a:tcPr/>
+                </a:tc>
+                <a:tc>
+                  <a:txBody>
+                    <a:bodyPr/>
+                    <a:lstStyle/>
+                    <a:p>
+                      <a:endParaRPr lang="en-US"/>
+                    </a:p>
+                  </a:txBody>
+                  <a:tcPr/>
+                </a:tc>
+                <a:tc>
+                  <a:txBody>
+                    <a:bodyPr/>
+                    <a:lstStyle/>
+                    <a:p>
+                      <a:endParaRPr lang="en-US"/>
+                    </a:p>
+                  </a:txBody>
+                  <a:tcPr/>
+                </a:tc>
+                <a:tc>
+                  <a:txBody>
+                    <a:bodyPr/>
+                    <a:lstStyle/>
+                    <a:p>
+                      <a:endParaRPr lang="en-US"/>
+                    </a:p>
+                  </a:txBody>
+                  <a:tcPr/>
+                </a:tc>
+                <a:tc>
+                  <a:txBody>
+                    <a:bodyPr/>
+                    <a:lstStyle/>
+                    <a:p>
+                      <a:pPr lvl="0">
+                        <a:buNone/>
+                      </a:pPr>
+                      <a:endParaRPr lang="en-US" dirty="0"/>
+                    </a:p>
+                  </a:txBody>
+                  <a:tcPr/>
+                </a:tc>
+                <a:extLst>
+                  <a:ext uri="{0D108BD9-81ED-4DB2-BD59-A6C34878D82A}">
+                    <a16:rowId xmlns:a16="http://schemas.microsoft.com/office/drawing/2014/main" val="898869918"/>
+                  </a:ext>
+                </a:extLst>
+              </a:tr>
+              <a:tr h="370839">
+                <a:tc>
+                  <a:txBody>
+                    <a:bodyPr/>
+                    <a:lstStyle/>
+                    <a:p>
+                      <a:pPr lvl="0">
+                        <a:buNone/>
+                      </a:pPr>
+                      <a:r>
+                        <a:rPr lang="en-US" dirty="0"/>
+                        <a:t>Washinton</a:t>
+                      </a:r>
+                    </a:p>
+                  </a:txBody>
+                  <a:tcPr/>
+                </a:tc>
+                <a:tc>
+                  <a:txBody>
+                    <a:bodyPr/>
+                    <a:lstStyle/>
+                    <a:p>
+                      <a:pPr lvl="0">
+                        <a:buNone/>
+                      </a:pPr>
+                      <a:r>
+                        <a:rPr lang="en-US" dirty="0"/>
+                        <a:t>Utah</a:t>
+                      </a:r>
+                    </a:p>
+                  </a:txBody>
+                  <a:tcPr/>
+                </a:tc>
+                <a:tc>
+                  <a:txBody>
+                    <a:bodyPr/>
+                    <a:lstStyle/>
+                    <a:p>
+                      <a:pPr lvl="0">
+                        <a:buNone/>
+                      </a:pPr>
+                      <a:endParaRPr lang="en-US" dirty="0"/>
+                    </a:p>
+                  </a:txBody>
+                  <a:tcPr/>
+                </a:tc>
+                <a:tc>
+                  <a:txBody>
+                    <a:bodyPr/>
+                    <a:lstStyle/>
+                    <a:p>
+                      <a:pPr lvl="0">
+                        <a:buNone/>
+                      </a:pPr>
+                      <a:endParaRPr lang="en-US" dirty="0"/>
+                    </a:p>
+                  </a:txBody>
+                  <a:tcPr/>
+                </a:tc>
+                <a:tc>
+                  <a:txBody>
+                    <a:bodyPr/>
+                    <a:lstStyle/>
+                    <a:p>
+                      <a:pPr lvl="0">
+                        <a:buNone/>
+                      </a:pPr>
+                      <a:endParaRPr lang="en-US" dirty="0"/>
+                    </a:p>
+                  </a:txBody>
+                  <a:tcPr/>
+                </a:tc>
+                <a:tc>
+                  <a:txBody>
+                    <a:bodyPr/>
+                    <a:lstStyle/>
+                    <a:p>
+                      <a:pPr lvl="0">
+                        <a:buNone/>
+                      </a:pPr>
+                      <a:endParaRPr lang="en-US" dirty="0"/>
+                    </a:p>
+                  </a:txBody>
+                  <a:tcPr/>
+                </a:tc>
+                <a:extLst>
+                  <a:ext uri="{0D108BD9-81ED-4DB2-BD59-A6C34878D82A}">
+                    <a16:rowId xmlns:a16="http://schemas.microsoft.com/office/drawing/2014/main" val="3886247608"/>
+                  </a:ext>
+                </a:extLst>
+              </a:tr>
+              <a:tr h="370838">
+                <a:tc>
+                  <a:txBody>
+                    <a:bodyPr/>
+                    <a:lstStyle/>
+                    <a:p>
+                      <a:pPr lvl="0">
+                        <a:buNone/>
+                      </a:pPr>
+                      <a:r>
+                        <a:rPr lang="en-US" dirty="0"/>
+                        <a:t>Texas</a:t>
+                      </a:r>
+                    </a:p>
+                  </a:txBody>
+                  <a:tcPr/>
+                </a:tc>
+                <a:tc>
+                  <a:txBody>
+                    <a:bodyPr/>
+                    <a:lstStyle/>
+                    <a:p>
+                      <a:pPr lvl="0">
+                        <a:buNone/>
+                      </a:pPr>
+                      <a:r>
+                        <a:rPr lang="en-US" dirty="0"/>
+                        <a:t>Oklahoma</a:t>
+                      </a:r>
+                    </a:p>
+                  </a:txBody>
+                  <a:tcPr/>
+                </a:tc>
+                <a:tc>
+                  <a:txBody>
+                    <a:bodyPr/>
+                    <a:lstStyle/>
+                    <a:p>
+                      <a:pPr lvl="0">
+                        <a:buNone/>
+                      </a:pPr>
+                      <a:endParaRPr lang="en-US" dirty="0"/>
+                    </a:p>
+                  </a:txBody>
+                  <a:tcPr/>
+                </a:tc>
+                <a:tc>
+                  <a:txBody>
+                    <a:bodyPr/>
+                    <a:lstStyle/>
+                    <a:p>
+                      <a:pPr lvl="0">
+                        <a:buNone/>
+                      </a:pPr>
+                      <a:endParaRPr lang="en-US" dirty="0"/>
+                    </a:p>
+                  </a:txBody>
+                  <a:tcPr/>
+                </a:tc>
+                <a:tc>
+                  <a:txBody>
+                    <a:bodyPr/>
+                    <a:lstStyle/>
+                    <a:p>
+                      <a:pPr lvl="0">
+                        <a:buNone/>
+                      </a:pPr>
+                      <a:endParaRPr lang="en-US" dirty="0"/>
+                    </a:p>
+                  </a:txBody>
+                  <a:tcPr/>
+                </a:tc>
+                <a:tc>
+                  <a:txBody>
+                    <a:bodyPr/>
+                    <a:lstStyle/>
+                    <a:p>
+                      <a:pPr lvl="0">
+                        <a:buNone/>
+                      </a:pPr>
+                      <a:endParaRPr lang="en-US" dirty="0"/>
+                    </a:p>
+                  </a:txBody>
+                  <a:tcPr/>
+                </a:tc>
+                <a:extLst>
+                  <a:ext uri="{0D108BD9-81ED-4DB2-BD59-A6C34878D82A}">
+                    <a16:rowId xmlns:a16="http://schemas.microsoft.com/office/drawing/2014/main" val="883367125"/>
+                  </a:ext>
+                </a:extLst>
+              </a:tr>
+              <a:tr h="370838">
+                <a:tc>
+                  <a:txBody>
+                    <a:bodyPr/>
+                    <a:lstStyle/>
+                    <a:p>
+                      <a:pPr lvl="0">
+                        <a:buNone/>
+                      </a:pPr>
+                      <a:r>
+                        <a:rPr lang="en-US" dirty="0"/>
+                        <a:t>Clemson</a:t>
+                      </a:r>
+                    </a:p>
+                  </a:txBody>
+                  <a:tcPr/>
+                </a:tc>
+                <a:tc>
+                  <a:txBody>
+                    <a:bodyPr/>
+                    <a:lstStyle/>
+                    <a:p>
+                      <a:pPr lvl="0">
+                        <a:buNone/>
+                      </a:pPr>
+                      <a:r>
+                        <a:rPr lang="en-US" dirty="0"/>
+                        <a:t>Pitt</a:t>
+                      </a:r>
+                    </a:p>
+                  </a:txBody>
+                  <a:tcPr/>
+                </a:tc>
+                <a:tc>
+                  <a:txBody>
+                    <a:bodyPr/>
+                    <a:lstStyle/>
+                    <a:p>
+                      <a:pPr lvl="0">
+                        <a:buNone/>
+                      </a:pPr>
+                      <a:endParaRPr lang="en-US" dirty="0"/>
+                    </a:p>
+                  </a:txBody>
+                  <a:tcPr/>
+                </a:tc>
+                <a:tc>
+                  <a:txBody>
+                    <a:bodyPr/>
+                    <a:lstStyle/>
+                    <a:p>
+                      <a:pPr lvl="0">
+                        <a:buNone/>
+                      </a:pPr>
+                      <a:endParaRPr lang="en-US" dirty="0"/>
+                    </a:p>
+                  </a:txBody>
+                  <a:tcPr/>
+                </a:tc>
+                <a:tc>
+                  <a:txBody>
+                    <a:bodyPr/>
+                    <a:lstStyle/>
+                    <a:p>
+                      <a:pPr lvl="0">
+                        <a:buNone/>
+                      </a:pPr>
+                      <a:endParaRPr lang="en-US" dirty="0"/>
+                    </a:p>
+                  </a:txBody>
+                  <a:tcPr/>
+                </a:tc>
+                <a:tc>
+                  <a:txBody>
+                    <a:bodyPr/>
+                    <a:lstStyle/>
+                    <a:p>
+                      <a:pPr lvl="0">
+                        <a:buNone/>
+                      </a:pPr>
+                      <a:endParaRPr lang="en-US" dirty="0"/>
+                    </a:p>
+                  </a:txBody>
+                  <a:tcPr/>
+                </a:tc>
+                <a:extLst>
+                  <a:ext uri="{0D108BD9-81ED-4DB2-BD59-A6C34878D82A}">
+                    <a16:rowId xmlns:a16="http://schemas.microsoft.com/office/drawing/2014/main" val="3789986908"/>
+                  </a:ext>
+                </a:extLst>
+              </a:tr>
+            </a:tbl>
+          </a:graphicData>
+        </a:graphic>
+      </p:graphicFrame>
+      <p:sp>
+        <p:nvSpPr>
+          <p:cNvPr id="6" name="TextBox 5">
+            <a:extLst>
+              <a:ext uri="{FF2B5EF4-FFF2-40B4-BE49-F238E27FC236}">
+                <a16:creationId xmlns:a16="http://schemas.microsoft.com/office/drawing/2014/main" id="{06A6DF50-0464-4455-8FC7-427F48B7FFE8}"/>
+              </a:ext>
+            </a:extLst>
+          </p:cNvPr>
+          <p:cNvSpPr txBox="1"/>
+          <p:nvPr/>
+        </p:nvSpPr>
+        <p:spPr>
+          <a:xfrm>
+            <a:off x="2150533" y="5486400"/>
+            <a:ext cx="2743200" cy="1477328"/>
+          </a:xfrm>
+          <a:prstGeom prst="rect">
+            <a:avLst/>
+          </a:prstGeom>
+        </p:spPr>
+        <p:txBody>
+          <a:bodyPr rot="0" spcFirstLastPara="0" vertOverflow="overflow" horzOverflow="overflow" vert="horz" wrap="square" lIns="91440" tIns="45720" rIns="91440" bIns="45720" numCol="1" spcCol="0" rtlCol="0" fromWordArt="0" anchor="t" anchorCtr="0" forceAA="0" compatLnSpc="1">
+            <a:prstTxWarp prst="textNoShape">
+              <a:avLst/>
+            </a:prstTxWarp>
+            <a:spAutoFit/>
+          </a:bodyPr>
+          <a:lstStyle/>
+          <a:p>
+            <a:r>
+              <a:rPr lang="en-US" dirty="0"/>
+              <a:t>IF we have time</a:t>
+            </a:r>
+            <a:r>
+              <a:rPr lang="en-US" dirty="0">
+                <a:cs typeface="Calibri"/>
+              </a:rPr>
+              <a:t>, we should see what the model predicts for these games which are happening this weekend</a:t>
+            </a:r>
+            <a:endParaRPr lang="en-US" dirty="0"/>
+          </a:p>
+        </p:txBody>
+      </p:sp>
+    </p:spTree>
+    <p:extLst>
+      <p:ext uri="{BB962C8B-B14F-4D97-AF65-F5344CB8AC3E}">
+        <p14:creationId xmlns:p14="http://schemas.microsoft.com/office/powerpoint/2010/main" val="2263836486"/>
+      </p:ext>
+    </p:extLst>
+  </p:cSld>
+  <p:clrMapOvr>
+    <a:masterClrMapping/>
+  </p:clrMapOvr>
+</p:sld>
+</file>
+
+<file path=ppt/slides/slide9.xml><?xml version="1.0" encoding="utf-8"?>
+<p:sld xmlns:a="http://schemas.openxmlformats.org/drawingml/2006/main" xmlns:r="http://schemas.openxmlformats.org/officeDocument/2006/relationships" xmlns:p="http://schemas.openxmlformats.org/presentationml/2006/main">
+  <p:cSld>
+    <p:spTree>
+      <p:nvGrpSpPr>
+        <p:cNvPr id="1" name=""/>
+        <p:cNvGrpSpPr/>
+        <p:nvPr/>
+      </p:nvGrpSpPr>
+      <p:grpSpPr>
+        <a:xfrm>
+          <a:off x="0" y="0"/>
+          <a:ext cx="0" cy="0"/>
+          <a:chOff x="0" y="0"/>
+          <a:chExt cx="0" cy="0"/>
+        </a:xfrm>
+      </p:grpSpPr>
+      <p:sp>
+        <p:nvSpPr>
           <p:cNvPr id="4" name="TextBox 3"/>
           <p:cNvSpPr txBox="1"/>
           <p:nvPr/>
@@ -5563,16 +6877,23 @@
           <a:noFill/>
         </p:spPr>
         <p:txBody>
-          <a:bodyPr wrap="square" rtlCol="0">
+          <a:bodyPr wrap="square" rtlCol="0" anchor="t">
             <a:spAutoFit/>
           </a:bodyPr>
           <a:lstStyle/>
           <a:p>
             <a:r>
-              <a:rPr lang="en-US" sz="4000" b="1" dirty="0" smtClean="0">
+              <a:rPr lang="en-US" sz="4000" b="1" dirty="0">
                 <a:latin typeface="+mj-lt"/>
               </a:rPr>
-              <a:t>Outlook</a:t>
+              <a:t>Future</a:t>
+            </a:r>
+            <a:r>
+              <a:rPr lang="en-US" sz="4000" b="1" dirty="0">
+                <a:latin typeface="+mj-lt"/>
+                <a:cs typeface="Calibri Light"/>
+              </a:rPr>
+              <a:t> Work</a:t>
             </a:r>
             <a:endParaRPr lang="en-US" sz="4000" b="1" dirty="0">
               <a:latin typeface="+mj-lt"/>
@@ -5597,7 +6918,7 @@
           <a:noFill/>
         </p:spPr>
         <p:txBody>
-          <a:bodyPr wrap="square" rtlCol="0">
+          <a:bodyPr wrap="square" rtlCol="0" anchor="t">
             <a:spAutoFit/>
           </a:bodyPr>
           <a:lstStyle/>
@@ -5607,12 +6928,8 @@
               <a:buChar char="•"/>
             </a:pPr>
             <a:r>
-              <a:rPr lang="en-US" sz="3200" dirty="0" smtClean="0"/>
-              <a:t>vary number of neurons on different </a:t>
-            </a:r>
-            <a:r>
-              <a:rPr lang="en-US" sz="3200" dirty="0" smtClean="0"/>
-              <a:t>layer</a:t>
+              <a:rPr lang="en-US" sz="3200" dirty="0"/>
+              <a:t>Vary number of neurons on different layer</a:t>
             </a:r>
           </a:p>
           <a:p>
@@ -5621,10 +6938,12 @@
               <a:buChar char="•"/>
             </a:pPr>
             <a:r>
-              <a:rPr lang="en-US" sz="3200" dirty="0" smtClean="0"/>
-              <a:t>try on convolutional networks, vary # of filters and filter sizes.</a:t>
-            </a:r>
-            <a:endParaRPr lang="en-US" sz="3200" dirty="0"/>
+              <a:rPr lang="en-US" sz="3200" dirty="0"/>
+              <a:t>Try on convolutional networks, vary # of filters and filter sizes.</a:t>
+            </a:r>
+            <a:endParaRPr lang="en-US" sz="3200" dirty="0">
+              <a:cs typeface="Calibri"/>
+            </a:endParaRPr>
           </a:p>
         </p:txBody>
       </p:sp>
@@ -5638,13 +6957,6 @@
   <p:clrMapOvr>
     <a:masterClrMapping/>
   </p:clrMapOvr>
-  <p:timing>
-    <p:tnLst>
-      <p:par>
-        <p:cTn xmlns:p14="http://schemas.microsoft.com/office/powerpoint/2010/main" id="1" dur="indefinite" restart="never" nodeType="tmRoot"/>
-      </p:par>
-    </p:tnLst>
-  </p:timing>
 </p:sld>
 </file>
 
@@ -5903,7 +7215,7 @@
   <a:extraClrSchemeLst/>
   <a:extLst>
     <a:ext uri="{05A4C25C-085E-4340-85A3-A5531E510DB2}">
-      <thm15:themeFamily xmlns:thm15="http://schemas.microsoft.com/office/thememl/2012/main" xmlns="" name="Office Theme" id="{62F939B6-93AF-4DB8-9C6B-D6C7DFDC589F}" vid="{4A3C46E8-61CC-4603-A589-7422A47A8E4A}"/>
+      <thm15:themeFamily xmlns:thm15="http://schemas.microsoft.com/office/thememl/2012/main" name="Office Theme" id="{62F939B6-93AF-4DB8-9C6B-D6C7DFDC589F}" vid="{4A3C46E8-61CC-4603-A589-7422A47A8E4A}"/>
     </a:ext>
   </a:extLst>
 </a:theme>
@@ -6164,7 +7476,7 @@
   <a:extraClrSchemeLst/>
   <a:extLst>
     <a:ext uri="{05A4C25C-085E-4340-85A3-A5531E510DB2}">
-      <thm15:themeFamily xmlns:thm15="http://schemas.microsoft.com/office/thememl/2012/main" xmlns="" name="Office Theme" id="{62F939B6-93AF-4DB8-9C6B-D6C7DFDC589F}" vid="{4A3C46E8-61CC-4603-A589-7422A47A8E4A}"/>
+      <thm15:themeFamily xmlns:thm15="http://schemas.microsoft.com/office/thememl/2012/main" name="Office Theme" id="{62F939B6-93AF-4DB8-9C6B-D6C7DFDC589F}" vid="{4A3C46E8-61CC-4603-A589-7422A47A8E4A}"/>
     </a:ext>
   </a:extLst>
 </a:theme>

</xml_diff>